<commit_message>
Final commit before submission
</commit_message>
<xml_diff>
--- a/SolutionPresentation.pptx
+++ b/SolutionPresentation.pptx
@@ -6,23 +6,24 @@
     <p:sldMasterId id="2147483673" r:id="rId2"/>
   </p:sldMasterIdLst>
   <p:notesMasterIdLst>
-    <p:notesMasterId r:id="rId17"/>
+    <p:notesMasterId r:id="rId18"/>
   </p:notesMasterIdLst>
   <p:sldIdLst>
     <p:sldId id="256" r:id="rId3"/>
     <p:sldId id="257" r:id="rId4"/>
     <p:sldId id="269" r:id="rId5"/>
     <p:sldId id="264" r:id="rId6"/>
-    <p:sldId id="259" r:id="rId7"/>
-    <p:sldId id="265" r:id="rId8"/>
-    <p:sldId id="260" r:id="rId9"/>
-    <p:sldId id="267" r:id="rId10"/>
-    <p:sldId id="261" r:id="rId11"/>
-    <p:sldId id="270" r:id="rId12"/>
-    <p:sldId id="266" r:id="rId13"/>
-    <p:sldId id="268" r:id="rId14"/>
-    <p:sldId id="262" r:id="rId15"/>
-    <p:sldId id="263" r:id="rId16"/>
+    <p:sldId id="271" r:id="rId7"/>
+    <p:sldId id="259" r:id="rId8"/>
+    <p:sldId id="265" r:id="rId9"/>
+    <p:sldId id="260" r:id="rId10"/>
+    <p:sldId id="267" r:id="rId11"/>
+    <p:sldId id="261" r:id="rId12"/>
+    <p:sldId id="270" r:id="rId13"/>
+    <p:sldId id="266" r:id="rId14"/>
+    <p:sldId id="268" r:id="rId15"/>
+    <p:sldId id="262" r:id="rId16"/>
+    <p:sldId id="263" r:id="rId17"/>
   </p:sldIdLst>
   <p:sldSz cx="10080625" cy="7559675"/>
   <p:notesSz cx="7559675" cy="10691813"/>
@@ -907,6 +908,114 @@
               </a:spcAft>
               <a:buNone/>
             </a:pPr>
+            <a:r>
+              <a:rPr lang="en-US" dirty="0"/>
+              <a:t>Video Link</a:t>
+            </a:r>
+            <a:endParaRPr dirty="0"/>
+          </a:p>
+        </p:txBody>
+      </p:sp>
+      <p:sp>
+        <p:nvSpPr>
+          <p:cNvPr id="149" name="Shape 149"/>
+          <p:cNvSpPr>
+            <a:spLocks noGrp="1" noRot="1" noChangeAspect="1"/>
+          </p:cNvSpPr>
+          <p:nvPr>
+            <p:ph type="sldImg" idx="2"/>
+          </p:nvPr>
+        </p:nvSpPr>
+        <p:spPr>
+          <a:xfrm>
+            <a:off x="1108075" y="801688"/>
+            <a:ext cx="5345113" cy="4010025"/>
+          </a:xfrm>
+          <a:custGeom>
+            <a:avLst/>
+            <a:gdLst/>
+            <a:ahLst/>
+            <a:cxnLst/>
+            <a:rect l="0" t="0" r="0" b="0"/>
+            <a:pathLst>
+              <a:path w="120000" h="120000" extrusionOk="0">
+                <a:moveTo>
+                  <a:pt x="0" y="0"/>
+                </a:moveTo>
+                <a:lnTo>
+                  <a:pt x="120000" y="0"/>
+                </a:lnTo>
+                <a:lnTo>
+                  <a:pt x="120000" y="120000"/>
+                </a:lnTo>
+                <a:lnTo>
+                  <a:pt x="0" y="120000"/>
+                </a:lnTo>
+                <a:close/>
+              </a:path>
+            </a:pathLst>
+          </a:custGeom>
+        </p:spPr>
+      </p:sp>
+    </p:spTree>
+  </p:cSld>
+  <p:clrMapOvr>
+    <a:masterClrMapping/>
+  </p:clrMapOvr>
+</p:notes>
+</file>
+
+<file path=ppt/notesSlides/notesSlide11.xml><?xml version="1.0" encoding="utf-8"?>
+<p:notes xmlns:a="http://schemas.openxmlformats.org/drawingml/2006/main" xmlns:r="http://schemas.openxmlformats.org/officeDocument/2006/relationships" xmlns:p="http://schemas.openxmlformats.org/presentationml/2006/main" showMasterSp="0" showMasterPhAnim="0">
+  <p:cSld>
+    <p:spTree>
+      <p:nvGrpSpPr>
+        <p:cNvPr id="1" name="Shape 147"/>
+        <p:cNvGrpSpPr/>
+        <p:nvPr/>
+      </p:nvGrpSpPr>
+      <p:grpSpPr>
+        <a:xfrm>
+          <a:off x="0" y="0"/>
+          <a:ext cx="0" cy="0"/>
+          <a:chOff x="0" y="0"/>
+          <a:chExt cx="0" cy="0"/>
+        </a:xfrm>
+      </p:grpSpPr>
+      <p:sp>
+        <p:nvSpPr>
+          <p:cNvPr id="148" name="Shape 148"/>
+          <p:cNvSpPr txBox="1">
+            <a:spLocks noGrp="1"/>
+          </p:cNvSpPr>
+          <p:nvPr>
+            <p:ph type="body" idx="1"/>
+          </p:nvPr>
+        </p:nvSpPr>
+        <p:spPr>
+          <a:xfrm>
+            <a:off x="755950" y="5078600"/>
+            <a:ext cx="6047725" cy="4811300"/>
+          </a:xfrm>
+          <a:prstGeom prst="rect">
+            <a:avLst/>
+          </a:prstGeom>
+        </p:spPr>
+        <p:txBody>
+          <a:bodyPr spcFirstLastPara="1" wrap="square" lIns="91425" tIns="91425" rIns="91425" bIns="91425" anchor="t" anchorCtr="0">
+            <a:noAutofit/>
+          </a:bodyPr>
+          <a:lstStyle/>
+          <a:p>
+            <a:pPr marL="0" lvl="0" indent="0">
+              <a:spcBef>
+                <a:spcPts val="0"/>
+              </a:spcBef>
+              <a:spcAft>
+                <a:spcPts val="0"/>
+              </a:spcAft>
+              <a:buNone/>
+            </a:pPr>
             <a:endParaRPr/>
           </a:p>
         </p:txBody>
@@ -965,7 +1074,7 @@
 </p:notes>
 </file>
 
-<file path=ppt/notesSlides/notesSlide11.xml><?xml version="1.0" encoding="utf-8"?>
+<file path=ppt/notesSlides/notesSlide12.xml><?xml version="1.0" encoding="utf-8"?>
 <p:notes xmlns:a="http://schemas.openxmlformats.org/drawingml/2006/main" xmlns:r="http://schemas.openxmlformats.org/officeDocument/2006/relationships" xmlns:p="http://schemas.openxmlformats.org/presentationml/2006/main" showMasterSp="0" showMasterPhAnim="0">
   <p:cSld>
     <p:spTree>
@@ -1074,7 +1183,7 @@
 </p:notes>
 </file>
 
-<file path=ppt/notesSlides/notesSlide12.xml><?xml version="1.0" encoding="utf-8"?>
+<file path=ppt/notesSlides/notesSlide13.xml><?xml version="1.0" encoding="utf-8"?>
 <p:notes xmlns:a="http://schemas.openxmlformats.org/drawingml/2006/main" xmlns:r="http://schemas.openxmlformats.org/officeDocument/2006/relationships" xmlns:p="http://schemas.openxmlformats.org/presentationml/2006/main" showMasterSp="0" showMasterPhAnim="0">
   <p:cSld>
     <p:spTree>
@@ -1183,7 +1292,7 @@
 </p:notes>
 </file>
 
-<file path=ppt/notesSlides/notesSlide13.xml><?xml version="1.0" encoding="utf-8"?>
+<file path=ppt/notesSlides/notesSlide14.xml><?xml version="1.0" encoding="utf-8"?>
 <p:notes xmlns:a="http://schemas.openxmlformats.org/drawingml/2006/main" xmlns:r="http://schemas.openxmlformats.org/officeDocument/2006/relationships" xmlns:p="http://schemas.openxmlformats.org/presentationml/2006/main" showMasterSp="0" showMasterPhAnim="0">
   <p:cSld>
     <p:spTree>
@@ -1287,7 +1396,7 @@
 </p:notes>
 </file>
 
-<file path=ppt/notesSlides/notesSlide14.xml><?xml version="1.0" encoding="utf-8"?>
+<file path=ppt/notesSlides/notesSlide15.xml><?xml version="1.0" encoding="utf-8"?>
 <p:notes xmlns:a="http://schemas.openxmlformats.org/drawingml/2006/main" xmlns:r="http://schemas.openxmlformats.org/officeDocument/2006/relationships" xmlns:p="http://schemas.openxmlformats.org/presentationml/2006/main" showMasterSp="0" showMasterPhAnim="0">
   <p:cSld>
     <p:spTree>
@@ -1718,6 +1827,115 @@
   <p:cSld>
     <p:spTree>
       <p:nvGrpSpPr>
+        <p:cNvPr id="1" name="Shape 119"/>
+        <p:cNvGrpSpPr/>
+        <p:nvPr/>
+      </p:nvGrpSpPr>
+      <p:grpSpPr>
+        <a:xfrm>
+          <a:off x="0" y="0"/>
+          <a:ext cx="0" cy="0"/>
+          <a:chOff x="0" y="0"/>
+          <a:chExt cx="0" cy="0"/>
+        </a:xfrm>
+      </p:grpSpPr>
+      <p:sp>
+        <p:nvSpPr>
+          <p:cNvPr id="120" name="Shape 120"/>
+          <p:cNvSpPr txBox="1">
+            <a:spLocks noGrp="1"/>
+          </p:cNvSpPr>
+          <p:nvPr>
+            <p:ph type="body" idx="1"/>
+          </p:nvPr>
+        </p:nvSpPr>
+        <p:spPr>
+          <a:xfrm>
+            <a:off x="755950" y="5078600"/>
+            <a:ext cx="6047725" cy="4811300"/>
+          </a:xfrm>
+          <a:prstGeom prst="rect">
+            <a:avLst/>
+          </a:prstGeom>
+        </p:spPr>
+        <p:txBody>
+          <a:bodyPr spcFirstLastPara="1" wrap="square" lIns="91425" tIns="91425" rIns="91425" bIns="91425" anchor="t" anchorCtr="0">
+            <a:noAutofit/>
+          </a:bodyPr>
+          <a:lstStyle/>
+          <a:p>
+            <a:pPr marL="0" lvl="0" indent="0">
+              <a:spcBef>
+                <a:spcPts val="0"/>
+              </a:spcBef>
+              <a:spcAft>
+                <a:spcPts val="0"/>
+              </a:spcAft>
+              <a:buNone/>
+            </a:pPr>
+            <a:endParaRPr/>
+          </a:p>
+        </p:txBody>
+      </p:sp>
+      <p:sp>
+        <p:nvSpPr>
+          <p:cNvPr id="121" name="Shape 121"/>
+          <p:cNvSpPr>
+            <a:spLocks noGrp="1" noRot="1" noChangeAspect="1"/>
+          </p:cNvSpPr>
+          <p:nvPr>
+            <p:ph type="sldImg" idx="2"/>
+          </p:nvPr>
+        </p:nvSpPr>
+        <p:spPr>
+          <a:xfrm>
+            <a:off x="1108075" y="801688"/>
+            <a:ext cx="5345113" cy="4010025"/>
+          </a:xfrm>
+          <a:custGeom>
+            <a:avLst/>
+            <a:gdLst/>
+            <a:ahLst/>
+            <a:cxnLst/>
+            <a:rect l="0" t="0" r="0" b="0"/>
+            <a:pathLst>
+              <a:path w="120000" h="120000" extrusionOk="0">
+                <a:moveTo>
+                  <a:pt x="0" y="0"/>
+                </a:moveTo>
+                <a:lnTo>
+                  <a:pt x="120000" y="0"/>
+                </a:lnTo>
+                <a:lnTo>
+                  <a:pt x="120000" y="120000"/>
+                </a:lnTo>
+                <a:lnTo>
+                  <a:pt x="0" y="120000"/>
+                </a:lnTo>
+                <a:close/>
+              </a:path>
+            </a:pathLst>
+          </a:custGeom>
+        </p:spPr>
+      </p:sp>
+    </p:spTree>
+    <p:extLst>
+      <p:ext uri="{BB962C8B-B14F-4D97-AF65-F5344CB8AC3E}">
+        <p14:creationId xmlns:p14="http://schemas.microsoft.com/office/powerpoint/2010/main" val="279918834"/>
+      </p:ext>
+    </p:extLst>
+  </p:cSld>
+  <p:clrMapOvr>
+    <a:masterClrMapping/>
+  </p:clrMapOvr>
+</p:notes>
+</file>
+
+<file path=ppt/notesSlides/notesSlide6.xml><?xml version="1.0" encoding="utf-8"?>
+<p:notes xmlns:a="http://schemas.openxmlformats.org/drawingml/2006/main" xmlns:r="http://schemas.openxmlformats.org/officeDocument/2006/relationships" xmlns:p="http://schemas.openxmlformats.org/presentationml/2006/main" showMasterSp="0" showMasterPhAnim="0">
+  <p:cSld>
+    <p:spTree>
+      <p:nvGrpSpPr>
         <p:cNvPr id="1" name="Shape 133"/>
         <p:cNvGrpSpPr/>
         <p:nvPr/>
@@ -1817,7 +2035,7 @@
 </p:notes>
 </file>
 
-<file path=ppt/notesSlides/notesSlide6.xml><?xml version="1.0" encoding="utf-8"?>
+<file path=ppt/notesSlides/notesSlide7.xml><?xml version="1.0" encoding="utf-8"?>
 <p:notes xmlns:a="http://schemas.openxmlformats.org/drawingml/2006/main" xmlns:r="http://schemas.openxmlformats.org/officeDocument/2006/relationships" xmlns:p="http://schemas.openxmlformats.org/presentationml/2006/main" showMasterSp="0" showMasterPhAnim="0">
   <p:cSld>
     <p:spTree>
@@ -1926,7 +2144,7 @@
 </p:notes>
 </file>
 
-<file path=ppt/notesSlides/notesSlide7.xml><?xml version="1.0" encoding="utf-8"?>
+<file path=ppt/notesSlides/notesSlide8.xml><?xml version="1.0" encoding="utf-8"?>
 <p:notes xmlns:a="http://schemas.openxmlformats.org/drawingml/2006/main" xmlns:r="http://schemas.openxmlformats.org/officeDocument/2006/relationships" xmlns:p="http://schemas.openxmlformats.org/presentationml/2006/main" showMasterSp="0" showMasterPhAnim="0">
   <p:cSld>
     <p:spTree>
@@ -2030,7 +2248,7 @@
 </p:notes>
 </file>
 
-<file path=ppt/notesSlides/notesSlide8.xml><?xml version="1.0" encoding="utf-8"?>
+<file path=ppt/notesSlides/notesSlide9.xml><?xml version="1.0" encoding="utf-8"?>
 <p:notes xmlns:a="http://schemas.openxmlformats.org/drawingml/2006/main" xmlns:r="http://schemas.openxmlformats.org/officeDocument/2006/relationships" xmlns:p="http://schemas.openxmlformats.org/presentationml/2006/main" showMasterSp="0" showMasterPhAnim="0">
   <p:cSld>
     <p:spTree>
@@ -2132,110 +2350,6 @@
         <p14:creationId xmlns:p14="http://schemas.microsoft.com/office/powerpoint/2010/main" val="1268415271"/>
       </p:ext>
     </p:extLst>
-  </p:cSld>
-  <p:clrMapOvr>
-    <a:masterClrMapping/>
-  </p:clrMapOvr>
-</p:notes>
-</file>
-
-<file path=ppt/notesSlides/notesSlide9.xml><?xml version="1.0" encoding="utf-8"?>
-<p:notes xmlns:a="http://schemas.openxmlformats.org/drawingml/2006/main" xmlns:r="http://schemas.openxmlformats.org/officeDocument/2006/relationships" xmlns:p="http://schemas.openxmlformats.org/presentationml/2006/main" showMasterSp="0" showMasterPhAnim="0">
-  <p:cSld>
-    <p:spTree>
-      <p:nvGrpSpPr>
-        <p:cNvPr id="1" name="Shape 147"/>
-        <p:cNvGrpSpPr/>
-        <p:nvPr/>
-      </p:nvGrpSpPr>
-      <p:grpSpPr>
-        <a:xfrm>
-          <a:off x="0" y="0"/>
-          <a:ext cx="0" cy="0"/>
-          <a:chOff x="0" y="0"/>
-          <a:chExt cx="0" cy="0"/>
-        </a:xfrm>
-      </p:grpSpPr>
-      <p:sp>
-        <p:nvSpPr>
-          <p:cNvPr id="148" name="Shape 148"/>
-          <p:cNvSpPr txBox="1">
-            <a:spLocks noGrp="1"/>
-          </p:cNvSpPr>
-          <p:nvPr>
-            <p:ph type="body" idx="1"/>
-          </p:nvPr>
-        </p:nvSpPr>
-        <p:spPr>
-          <a:xfrm>
-            <a:off x="755950" y="5078600"/>
-            <a:ext cx="6047725" cy="4811300"/>
-          </a:xfrm>
-          <a:prstGeom prst="rect">
-            <a:avLst/>
-          </a:prstGeom>
-        </p:spPr>
-        <p:txBody>
-          <a:bodyPr spcFirstLastPara="1" wrap="square" lIns="91425" tIns="91425" rIns="91425" bIns="91425" anchor="t" anchorCtr="0">
-            <a:noAutofit/>
-          </a:bodyPr>
-          <a:lstStyle/>
-          <a:p>
-            <a:pPr marL="0" lvl="0" indent="0">
-              <a:spcBef>
-                <a:spcPts val="0"/>
-              </a:spcBef>
-              <a:spcAft>
-                <a:spcPts val="0"/>
-              </a:spcAft>
-              <a:buNone/>
-            </a:pPr>
-            <a:endParaRPr/>
-          </a:p>
-        </p:txBody>
-      </p:sp>
-      <p:sp>
-        <p:nvSpPr>
-          <p:cNvPr id="149" name="Shape 149"/>
-          <p:cNvSpPr>
-            <a:spLocks noGrp="1" noRot="1" noChangeAspect="1"/>
-          </p:cNvSpPr>
-          <p:nvPr>
-            <p:ph type="sldImg" idx="2"/>
-          </p:nvPr>
-        </p:nvSpPr>
-        <p:spPr>
-          <a:xfrm>
-            <a:off x="1108075" y="801688"/>
-            <a:ext cx="5345113" cy="4010025"/>
-          </a:xfrm>
-          <a:custGeom>
-            <a:avLst/>
-            <a:gdLst/>
-            <a:ahLst/>
-            <a:cxnLst/>
-            <a:rect l="0" t="0" r="0" b="0"/>
-            <a:pathLst>
-              <a:path w="120000" h="120000" extrusionOk="0">
-                <a:moveTo>
-                  <a:pt x="0" y="0"/>
-                </a:moveTo>
-                <a:lnTo>
-                  <a:pt x="120000" y="0"/>
-                </a:lnTo>
-                <a:lnTo>
-                  <a:pt x="120000" y="120000"/>
-                </a:lnTo>
-                <a:lnTo>
-                  <a:pt x="0" y="120000"/>
-                </a:lnTo>
-                <a:close/>
-              </a:path>
-            </a:pathLst>
-          </a:custGeom>
-        </p:spPr>
-      </p:sp>
-    </p:spTree>
   </p:cSld>
   <p:clrMapOvr>
     <a:masterClrMapping/>
@@ -14259,7 +14373,7 @@
         <p:spPr>
           <a:xfrm>
             <a:off x="647640" y="1086120"/>
-            <a:ext cx="8566920" cy="920480"/>
+            <a:ext cx="8566920" cy="1136380"/>
           </a:xfrm>
           <a:prstGeom prst="rect">
             <a:avLst/>
@@ -14297,29 +14411,17 @@
                 <a:cs typeface="Arial"/>
                 <a:sym typeface="Arial"/>
               </a:rPr>
-              <a:t>Application URL </a:t>
+              <a:t>Prototype Demo</a:t>
             </a:r>
           </a:p>
           <a:p>
-            <a:pPr marL="0" marR="0" lvl="0" indent="0" algn="l" rtl="0">
-              <a:lnSpc>
-                <a:spcPct val="100000"/>
-              </a:lnSpc>
-              <a:spcBef>
-                <a:spcPts val="0"/>
-              </a:spcBef>
-              <a:spcAft>
-                <a:spcPts val="0"/>
-              </a:spcAft>
-              <a:buNone/>
-            </a:pPr>
             <a:r>
               <a:rPr lang="en-IN" dirty="0">
                 <a:solidFill>
                   <a:srgbClr val="FFFFFF"/>
                 </a:solidFill>
               </a:rPr>
-              <a:t>If you have the application hosted somewhere for us to try do share the URL here.</a:t>
+              <a:t>Add a video link of the workable solution. Please cover as many output scenario’s as you can show from the output excel provided. (Mandatory)</a:t>
             </a:r>
             <a:endParaRPr lang="en-IN" dirty="0"/>
           </a:p>
@@ -14577,12 +14679,83 @@
           </a:p>
         </p:txBody>
       </p:sp>
+      <p:sp>
+        <p:nvSpPr>
+          <p:cNvPr id="2" name="Rectangle 1">
+            <a:extLst>
+              <a:ext uri="{FF2B5EF4-FFF2-40B4-BE49-F238E27FC236}">
+                <a16:creationId xmlns:a16="http://schemas.microsoft.com/office/drawing/2014/main" id="{F0A27999-5BEF-4B88-BE0B-5EDDD6C98AE4}"/>
+              </a:ext>
+            </a:extLst>
+          </p:cNvPr>
+          <p:cNvSpPr/>
+          <p:nvPr/>
+        </p:nvSpPr>
+        <p:spPr>
+          <a:xfrm>
+            <a:off x="723010" y="3733565"/>
+            <a:ext cx="2748610" cy="400110"/>
+          </a:xfrm>
+          <a:prstGeom prst="rect">
+            <a:avLst/>
+          </a:prstGeom>
+        </p:spPr>
+        <p:txBody>
+          <a:bodyPr wrap="square">
+            <a:spAutoFit/>
+          </a:bodyPr>
+          <a:lstStyle/>
+          <a:p>
+            <a:pPr lvl="0"/>
+            <a:r>
+              <a:rPr lang="en-US" sz="2000" b="1" dirty="0">
+                <a:hlinkClick r:id="rId4" action="ppaction://hlinkfile"/>
+              </a:rPr>
+              <a:t>Link to images</a:t>
+            </a:r>
+            <a:endParaRPr lang="en-US" sz="2000" b="1" dirty="0"/>
+          </a:p>
+        </p:txBody>
+      </p:sp>
+      <p:sp>
+        <p:nvSpPr>
+          <p:cNvPr id="3" name="Rectangle 2">
+            <a:extLst>
+              <a:ext uri="{FF2B5EF4-FFF2-40B4-BE49-F238E27FC236}">
+                <a16:creationId xmlns:a16="http://schemas.microsoft.com/office/drawing/2014/main" id="{5CA0E8B9-FA71-4F32-84ED-260A08FACBF5}"/>
+              </a:ext>
+            </a:extLst>
+          </p:cNvPr>
+          <p:cNvSpPr/>
+          <p:nvPr/>
+        </p:nvSpPr>
+        <p:spPr>
+          <a:xfrm>
+            <a:off x="723010" y="4426608"/>
+            <a:ext cx="1481496" cy="400110"/>
+          </a:xfrm>
+          <a:prstGeom prst="rect">
+            <a:avLst/>
+          </a:prstGeom>
+        </p:spPr>
+        <p:txBody>
+          <a:bodyPr wrap="none">
+            <a:spAutoFit/>
+          </a:bodyPr>
+          <a:lstStyle/>
+          <a:p>
+            <a:pPr lvl="0"/>
+            <a:r>
+              <a:rPr lang="en-US" sz="2000" b="1" dirty="0">
+                <a:hlinkClick r:id="rId5" action="ppaction://hlinkfile"/>
+              </a:rPr>
+              <a:t>Video Link</a:t>
+            </a:r>
+            <a:endParaRPr lang="en-US" sz="2000" b="1" dirty="0"/>
+          </a:p>
+        </p:txBody>
+      </p:sp>
     </p:spTree>
-    <p:extLst>
-      <p:ext uri="{BB962C8B-B14F-4D97-AF65-F5344CB8AC3E}">
-        <p14:creationId xmlns:p14="http://schemas.microsoft.com/office/powerpoint/2010/main" val="1103883079"/>
-      </p:ext>
-    </p:extLst>
   </p:cSld>
   <p:clrMapOvr>
     <a:masterClrMapping/>
@@ -14595,7 +14768,7 @@
   <p:cSld>
     <p:spTree>
       <p:nvGrpSpPr>
-        <p:cNvPr id="1" name="Shape 157"/>
+        <p:cNvPr id="1" name="Shape 150"/>
         <p:cNvGrpSpPr/>
         <p:nvPr/>
       </p:nvGrpSpPr>
@@ -14609,13 +14782,13 @@
       </p:grpSpPr>
       <p:sp>
         <p:nvSpPr>
-          <p:cNvPr id="158" name="Shape 158"/>
+          <p:cNvPr id="151" name="Shape 151"/>
           <p:cNvSpPr/>
           <p:nvPr/>
         </p:nvSpPr>
         <p:spPr>
           <a:xfrm>
-            <a:off x="503640" y="791640"/>
+            <a:off x="503640" y="789480"/>
             <a:ext cx="9138240" cy="4962600"/>
           </a:xfrm>
           <a:prstGeom prst="rect">
@@ -14629,12 +14802,15 @@
           </a:ln>
         </p:spPr>
         <p:txBody>
-          <a:bodyPr spcFirstLastPara="1" wrap="square" lIns="91425" tIns="91425" rIns="91425" bIns="91425" anchor="ctr" anchorCtr="0">
+          <a:bodyPr spcFirstLastPara="1" wrap="square" lIns="90000" tIns="45000" rIns="90000" bIns="45000" anchor="t" anchorCtr="0">
             <a:noAutofit/>
           </a:bodyPr>
           <a:lstStyle/>
           <a:p>
-            <a:pPr marL="0" lvl="0" indent="0">
+            <a:pPr marL="0" marR="0" lvl="0" indent="0" algn="l" rtl="0">
+              <a:lnSpc>
+                <a:spcPct val="100000"/>
+              </a:lnSpc>
               <a:spcBef>
                 <a:spcPts val="0"/>
               </a:spcBef>
@@ -14643,20 +14819,178 @@
               </a:spcAft>
               <a:buNone/>
             </a:pPr>
-            <a:endParaRPr/>
+            <a:endParaRPr sz="1800" b="0" i="0" u="none" strike="noStrike" cap="none">
+              <a:solidFill>
+                <a:srgbClr val="000000"/>
+              </a:solidFill>
+              <a:latin typeface="Arial"/>
+              <a:ea typeface="Arial"/>
+              <a:cs typeface="Arial"/>
+              <a:sym typeface="Arial"/>
+            </a:endParaRPr>
+          </a:p>
+          <a:p>
+            <a:pPr marL="0" marR="0" lvl="0" indent="0" algn="l" rtl="0">
+              <a:lnSpc>
+                <a:spcPct val="100000"/>
+              </a:lnSpc>
+              <a:spcBef>
+                <a:spcPts val="0"/>
+              </a:spcBef>
+              <a:spcAft>
+                <a:spcPts val="0"/>
+              </a:spcAft>
+              <a:buNone/>
+            </a:pPr>
+            <a:endParaRPr sz="1800" b="0" i="0" u="none" strike="noStrike" cap="none">
+              <a:solidFill>
+                <a:srgbClr val="000000"/>
+              </a:solidFill>
+              <a:latin typeface="Arial"/>
+              <a:ea typeface="Arial"/>
+              <a:cs typeface="Arial"/>
+              <a:sym typeface="Arial"/>
+            </a:endParaRPr>
+          </a:p>
+          <a:p>
+            <a:pPr marL="0" marR="0" lvl="0" indent="0" algn="l" rtl="0">
+              <a:lnSpc>
+                <a:spcPct val="100000"/>
+              </a:lnSpc>
+              <a:spcBef>
+                <a:spcPts val="0"/>
+              </a:spcBef>
+              <a:spcAft>
+                <a:spcPts val="0"/>
+              </a:spcAft>
+              <a:buNone/>
+            </a:pPr>
+            <a:endParaRPr sz="1800" b="0" i="0" u="none" strike="noStrike" cap="none">
+              <a:solidFill>
+                <a:srgbClr val="000000"/>
+              </a:solidFill>
+              <a:latin typeface="Arial"/>
+              <a:ea typeface="Arial"/>
+              <a:cs typeface="Arial"/>
+              <a:sym typeface="Arial"/>
+            </a:endParaRPr>
+          </a:p>
+          <a:p>
+            <a:pPr marL="0" marR="0" lvl="0" indent="0" algn="l" rtl="0">
+              <a:lnSpc>
+                <a:spcPct val="100000"/>
+              </a:lnSpc>
+              <a:spcBef>
+                <a:spcPts val="0"/>
+              </a:spcBef>
+              <a:spcAft>
+                <a:spcPts val="0"/>
+              </a:spcAft>
+              <a:buNone/>
+            </a:pPr>
+            <a:endParaRPr sz="1800" b="0" i="0" u="none" strike="noStrike" cap="none">
+              <a:solidFill>
+                <a:srgbClr val="000000"/>
+              </a:solidFill>
+              <a:latin typeface="Arial"/>
+              <a:ea typeface="Arial"/>
+              <a:cs typeface="Arial"/>
+              <a:sym typeface="Arial"/>
+            </a:endParaRPr>
+          </a:p>
+          <a:p>
+            <a:pPr marL="0" marR="0" lvl="0" indent="0" algn="l" rtl="0">
+              <a:lnSpc>
+                <a:spcPct val="100000"/>
+              </a:lnSpc>
+              <a:spcBef>
+                <a:spcPts val="0"/>
+              </a:spcBef>
+              <a:spcAft>
+                <a:spcPts val="0"/>
+              </a:spcAft>
+              <a:buNone/>
+            </a:pPr>
+            <a:r>
+              <a:rPr lang="en-IN" sz="1800" b="0" i="0" u="none" strike="noStrike" cap="none">
+                <a:solidFill>
+                  <a:srgbClr val="FFFFFF"/>
+                </a:solidFill>
+                <a:latin typeface="Arial"/>
+                <a:ea typeface="Arial"/>
+                <a:cs typeface="Arial"/>
+                <a:sym typeface="Arial"/>
+              </a:rPr>
+              <a:t> </a:t>
+            </a:r>
+            <a:endParaRPr sz="1800" b="0" i="0" u="none" strike="noStrike" cap="none">
+              <a:solidFill>
+                <a:srgbClr val="000000"/>
+              </a:solidFill>
+              <a:latin typeface="Arial"/>
+              <a:ea typeface="Arial"/>
+              <a:cs typeface="Arial"/>
+              <a:sym typeface="Arial"/>
+            </a:endParaRPr>
+          </a:p>
+          <a:p>
+            <a:pPr marL="0" marR="0" lvl="0" indent="0" algn="l" rtl="0">
+              <a:lnSpc>
+                <a:spcPct val="100000"/>
+              </a:lnSpc>
+              <a:spcBef>
+                <a:spcPts val="0"/>
+              </a:spcBef>
+              <a:spcAft>
+                <a:spcPts val="0"/>
+              </a:spcAft>
+              <a:buNone/>
+            </a:pPr>
+            <a:endParaRPr sz="1800" b="0" i="0" u="none" strike="noStrike" cap="none">
+              <a:solidFill>
+                <a:srgbClr val="000000"/>
+              </a:solidFill>
+              <a:latin typeface="Arial"/>
+              <a:ea typeface="Arial"/>
+              <a:cs typeface="Arial"/>
+              <a:sym typeface="Arial"/>
+            </a:endParaRPr>
+          </a:p>
+          <a:p>
+            <a:pPr marL="0" marR="0" lvl="0" indent="0" algn="l" rtl="0">
+              <a:lnSpc>
+                <a:spcPct val="100000"/>
+              </a:lnSpc>
+              <a:spcBef>
+                <a:spcPts val="0"/>
+              </a:spcBef>
+              <a:spcAft>
+                <a:spcPts val="0"/>
+              </a:spcAft>
+              <a:buNone/>
+            </a:pPr>
+            <a:endParaRPr sz="1800" b="0" i="0" u="none" strike="noStrike" cap="none">
+              <a:solidFill>
+                <a:srgbClr val="000000"/>
+              </a:solidFill>
+              <a:latin typeface="Arial"/>
+              <a:ea typeface="Arial"/>
+              <a:cs typeface="Arial"/>
+              <a:sym typeface="Arial"/>
+            </a:endParaRPr>
           </a:p>
         </p:txBody>
       </p:sp>
       <p:sp>
         <p:nvSpPr>
-          <p:cNvPr id="159" name="Shape 159"/>
+          <p:cNvPr id="152" name="Shape 152"/>
           <p:cNvSpPr/>
           <p:nvPr/>
         </p:nvSpPr>
         <p:spPr>
           <a:xfrm>
-            <a:off x="647640" y="903240"/>
-            <a:ext cx="7766640" cy="912860"/>
+            <a:off x="647640" y="1086120"/>
+            <a:ext cx="8566920" cy="920480"/>
           </a:xfrm>
           <a:prstGeom prst="rect">
             <a:avLst/>
@@ -14694,17 +15028,29 @@
                 <a:cs typeface="Arial"/>
                 <a:sym typeface="Arial"/>
               </a:rPr>
-              <a:t>Source Code</a:t>
+              <a:t>Application URL </a:t>
             </a:r>
           </a:p>
           <a:p>
+            <a:pPr marL="0" marR="0" lvl="0" indent="0" algn="l" rtl="0">
+              <a:lnSpc>
+                <a:spcPct val="100000"/>
+              </a:lnSpc>
+              <a:spcBef>
+                <a:spcPts val="0"/>
+              </a:spcBef>
+              <a:spcAft>
+                <a:spcPts val="0"/>
+              </a:spcAft>
+              <a:buNone/>
+            </a:pPr>
             <a:r>
               <a:rPr lang="en-IN" dirty="0">
                 <a:solidFill>
                   <a:srgbClr val="FFFFFF"/>
                 </a:solidFill>
               </a:rPr>
-              <a:t>GIT Link and Compile Instructions, Solution Hosted URL</a:t>
+              <a:t>If you have the application hosted somewhere for us to try do share the URL here.</a:t>
             </a:r>
             <a:endParaRPr lang="en-IN" dirty="0"/>
           </a:p>
@@ -14732,6 +15078,29 @@
             </a:endParaRPr>
           </a:p>
           <a:p>
+            <a:pPr marL="0" marR="0" lvl="0" indent="0" algn="l" rtl="0">
+              <a:lnSpc>
+                <a:spcPct val="100000"/>
+              </a:lnSpc>
+              <a:spcBef>
+                <a:spcPts val="0"/>
+              </a:spcBef>
+              <a:spcAft>
+                <a:spcPts val="0"/>
+              </a:spcAft>
+              <a:buNone/>
+            </a:pPr>
+            <a:endParaRPr sz="1800" b="0" i="0" u="none" strike="noStrike" cap="none" dirty="0">
+              <a:solidFill>
+                <a:srgbClr val="000000"/>
+              </a:solidFill>
+              <a:latin typeface="Arial"/>
+              <a:ea typeface="Arial"/>
+              <a:cs typeface="Arial"/>
+              <a:sym typeface="Arial"/>
+            </a:endParaRPr>
+          </a:p>
+          <a:p>
             <a:pPr marL="0" marR="0" lvl="0" indent="0" algn="ctr" rtl="0">
               <a:lnSpc>
                 <a:spcPct val="42000"/>
@@ -14781,7 +15150,7 @@
       </p:sp>
       <p:pic>
         <p:nvPicPr>
-          <p:cNvPr id="171" name="Shape 171"/>
+          <p:cNvPr id="153" name="Shape 153"/>
           <p:cNvPicPr preferRelativeResize="0"/>
           <p:nvPr/>
         </p:nvPicPr>
@@ -14814,8 +15183,8 @@
         </p:nvSpPr>
         <p:spPr>
           <a:xfrm>
-            <a:off x="800100" y="2082960"/>
-            <a:ext cx="8699500" cy="3323987"/>
+            <a:off x="723010" y="2318886"/>
+            <a:ext cx="8699500" cy="307777"/>
           </a:xfrm>
           <a:prstGeom prst="rect">
             <a:avLst/>
@@ -14828,123 +15197,22 @@
           </a:bodyPr>
           <a:lstStyle/>
           <a:p>
+            <a:pPr algn="ctr"/>
             <a:r>
               <a:rPr lang="en-US" dirty="0">
                 <a:solidFill>
                   <a:schemeClr val="bg1"/>
                 </a:solidFill>
               </a:rPr>
-              <a:t>GIT URL:</a:t>
+              <a:t>Application is not hosted currently but it can be viewed in a browser using R studio software.</a:t>
             </a:r>
-          </a:p>
-          <a:p>
-            <a:endParaRPr lang="en-US" dirty="0">
-              <a:solidFill>
-                <a:schemeClr val="bg1"/>
-              </a:solidFill>
-            </a:endParaRPr>
-          </a:p>
-          <a:p>
-            <a:r>
-              <a:rPr lang="en-US" dirty="0">
-                <a:solidFill>
-                  <a:schemeClr val="bg1"/>
-                </a:solidFill>
-              </a:rPr>
-              <a:t>Compile Instructions:</a:t>
-            </a:r>
-          </a:p>
-          <a:p>
-            <a:endParaRPr lang="en-US" dirty="0">
-              <a:solidFill>
-                <a:schemeClr val="bg1"/>
-              </a:solidFill>
-            </a:endParaRPr>
-          </a:p>
-          <a:p>
-            <a:endParaRPr lang="en-US" dirty="0">
-              <a:solidFill>
-                <a:schemeClr val="bg1"/>
-              </a:solidFill>
-            </a:endParaRPr>
-          </a:p>
-          <a:p>
-            <a:endParaRPr lang="en-US" dirty="0">
-              <a:solidFill>
-                <a:schemeClr val="bg1"/>
-              </a:solidFill>
-            </a:endParaRPr>
-          </a:p>
-          <a:p>
-            <a:endParaRPr lang="en-US" dirty="0">
-              <a:solidFill>
-                <a:schemeClr val="bg1"/>
-              </a:solidFill>
-            </a:endParaRPr>
-          </a:p>
-          <a:p>
-            <a:endParaRPr lang="en-US" dirty="0">
-              <a:solidFill>
-                <a:schemeClr val="bg1"/>
-              </a:solidFill>
-            </a:endParaRPr>
-          </a:p>
-          <a:p>
-            <a:endParaRPr lang="en-US" dirty="0">
-              <a:solidFill>
-                <a:schemeClr val="bg1"/>
-              </a:solidFill>
-            </a:endParaRPr>
-          </a:p>
-          <a:p>
-            <a:endParaRPr lang="en-US" dirty="0">
-              <a:solidFill>
-                <a:schemeClr val="bg1"/>
-              </a:solidFill>
-            </a:endParaRPr>
-          </a:p>
-          <a:p>
-            <a:endParaRPr lang="en-US" dirty="0">
-              <a:solidFill>
-                <a:schemeClr val="bg1"/>
-              </a:solidFill>
-            </a:endParaRPr>
-          </a:p>
-          <a:p>
-            <a:endParaRPr lang="en-US" dirty="0">
-              <a:solidFill>
-                <a:schemeClr val="bg1"/>
-              </a:solidFill>
-            </a:endParaRPr>
-          </a:p>
-          <a:p>
-            <a:endParaRPr lang="en-US" dirty="0">
-              <a:solidFill>
-                <a:schemeClr val="bg1"/>
-              </a:solidFill>
-            </a:endParaRPr>
-          </a:p>
-          <a:p>
-            <a:endParaRPr lang="en-US" dirty="0">
-              <a:solidFill>
-                <a:schemeClr val="bg1"/>
-              </a:solidFill>
-            </a:endParaRPr>
-          </a:p>
-          <a:p>
-            <a:pPr algn="ctr"/>
-            <a:endParaRPr lang="en-US" dirty="0">
-              <a:solidFill>
-                <a:schemeClr val="bg1"/>
-              </a:solidFill>
-            </a:endParaRPr>
           </a:p>
         </p:txBody>
       </p:sp>
     </p:spTree>
     <p:extLst>
       <p:ext uri="{BB962C8B-B14F-4D97-AF65-F5344CB8AC3E}">
-        <p14:creationId xmlns:p14="http://schemas.microsoft.com/office/powerpoint/2010/main" val="29856360"/>
+        <p14:creationId xmlns:p14="http://schemas.microsoft.com/office/powerpoint/2010/main" val="1103883079"/>
       </p:ext>
     </p:extLst>
   </p:cSld>
@@ -15020,6 +15288,392 @@
         <p:spPr>
           <a:xfrm>
             <a:off x="647640" y="903240"/>
+            <a:ext cx="7766640" cy="912860"/>
+          </a:xfrm>
+          <a:prstGeom prst="rect">
+            <a:avLst/>
+          </a:prstGeom>
+          <a:noFill/>
+          <a:ln>
+            <a:noFill/>
+          </a:ln>
+        </p:spPr>
+        <p:txBody>
+          <a:bodyPr spcFirstLastPara="1" wrap="square" lIns="90000" tIns="45000" rIns="90000" bIns="45000" anchor="t" anchorCtr="0">
+            <a:noAutofit/>
+          </a:bodyPr>
+          <a:lstStyle/>
+          <a:p>
+            <a:pPr marL="0" marR="0" lvl="0" indent="0" algn="l" rtl="0">
+              <a:lnSpc>
+                <a:spcPct val="100000"/>
+              </a:lnSpc>
+              <a:spcBef>
+                <a:spcPts val="0"/>
+              </a:spcBef>
+              <a:spcAft>
+                <a:spcPts val="0"/>
+              </a:spcAft>
+              <a:buNone/>
+            </a:pPr>
+            <a:r>
+              <a:rPr lang="en-IN" sz="3600" b="1" i="0" u="none" strike="noStrike" cap="none" dirty="0">
+                <a:solidFill>
+                  <a:srgbClr val="FFFFFF"/>
+                </a:solidFill>
+                <a:latin typeface="Arial"/>
+                <a:ea typeface="Arial"/>
+                <a:cs typeface="Arial"/>
+                <a:sym typeface="Arial"/>
+              </a:rPr>
+              <a:t>Source Code</a:t>
+            </a:r>
+          </a:p>
+          <a:p>
+            <a:r>
+              <a:rPr lang="en-IN" dirty="0">
+                <a:solidFill>
+                  <a:srgbClr val="FFFFFF"/>
+                </a:solidFill>
+              </a:rPr>
+              <a:t>GIT Link and Compile Instructions, Solution Hosted URL</a:t>
+            </a:r>
+            <a:endParaRPr lang="en-IN" dirty="0"/>
+          </a:p>
+          <a:p>
+            <a:pPr marL="0" marR="0" lvl="0" indent="0" algn="l" rtl="0">
+              <a:lnSpc>
+                <a:spcPct val="100000"/>
+              </a:lnSpc>
+              <a:spcBef>
+                <a:spcPts val="0"/>
+              </a:spcBef>
+              <a:spcAft>
+                <a:spcPts val="0"/>
+              </a:spcAft>
+              <a:buNone/>
+            </a:pPr>
+            <a:endParaRPr sz="1800" b="0" i="0" u="none" strike="noStrike" cap="none" dirty="0">
+              <a:solidFill>
+                <a:srgbClr val="000000"/>
+              </a:solidFill>
+              <a:latin typeface="Arial"/>
+              <a:ea typeface="Arial"/>
+              <a:cs typeface="Arial"/>
+              <a:sym typeface="Arial"/>
+            </a:endParaRPr>
+          </a:p>
+          <a:p>
+            <a:pPr marL="0" marR="0" lvl="0" indent="0" algn="ctr" rtl="0">
+              <a:lnSpc>
+                <a:spcPct val="42000"/>
+              </a:lnSpc>
+              <a:spcBef>
+                <a:spcPts val="0"/>
+              </a:spcBef>
+              <a:spcAft>
+                <a:spcPts val="0"/>
+              </a:spcAft>
+              <a:buNone/>
+            </a:pPr>
+            <a:endParaRPr sz="1800" b="0" i="0" u="none" strike="noStrike" cap="none" dirty="0">
+              <a:solidFill>
+                <a:srgbClr val="000000"/>
+              </a:solidFill>
+              <a:latin typeface="Arial"/>
+              <a:ea typeface="Arial"/>
+              <a:cs typeface="Arial"/>
+              <a:sym typeface="Arial"/>
+            </a:endParaRPr>
+          </a:p>
+          <a:p>
+            <a:pPr marL="0" marR="0" lvl="0" indent="0" algn="ctr" rtl="0">
+              <a:lnSpc>
+                <a:spcPct val="54000"/>
+              </a:lnSpc>
+              <a:spcBef>
+                <a:spcPts val="0"/>
+              </a:spcBef>
+              <a:spcAft>
+                <a:spcPts val="0"/>
+              </a:spcAft>
+              <a:buNone/>
+            </a:pPr>
+            <a:endParaRPr sz="1800" b="0" i="0" u="none" strike="noStrike" cap="none" dirty="0">
+              <a:solidFill>
+                <a:srgbClr val="000000"/>
+              </a:solidFill>
+              <a:latin typeface="Arial"/>
+              <a:ea typeface="Arial"/>
+              <a:cs typeface="Arial"/>
+              <a:sym typeface="Arial"/>
+            </a:endParaRPr>
+          </a:p>
+        </p:txBody>
+      </p:sp>
+      <p:pic>
+        <p:nvPicPr>
+          <p:cNvPr id="171" name="Shape 171"/>
+          <p:cNvPicPr preferRelativeResize="0"/>
+          <p:nvPr/>
+        </p:nvPicPr>
+        <p:blipFill rotWithShape="1">
+          <a:blip r:embed="rId3">
+            <a:alphaModFix/>
+          </a:blip>
+          <a:srcRect/>
+          <a:stretch/>
+        </p:blipFill>
+        <p:spPr>
+          <a:xfrm>
+            <a:off x="3888000" y="6782400"/>
+            <a:ext cx="2013480" cy="487080"/>
+          </a:xfrm>
+          <a:prstGeom prst="rect">
+            <a:avLst/>
+          </a:prstGeom>
+          <a:noFill/>
+          <a:ln>
+            <a:noFill/>
+          </a:ln>
+        </p:spPr>
+      </p:pic>
+      <p:sp>
+        <p:nvSpPr>
+          <p:cNvPr id="5" name="TextBox 4"/>
+          <p:cNvSpPr txBox="1"/>
+          <p:nvPr/>
+        </p:nvSpPr>
+        <p:spPr>
+          <a:xfrm>
+            <a:off x="800100" y="2082960"/>
+            <a:ext cx="8699500" cy="3323987"/>
+          </a:xfrm>
+          <a:prstGeom prst="rect">
+            <a:avLst/>
+          </a:prstGeom>
+          <a:noFill/>
+        </p:spPr>
+        <p:txBody>
+          <a:bodyPr wrap="square" rtlCol="0">
+            <a:spAutoFit/>
+          </a:bodyPr>
+          <a:lstStyle/>
+          <a:p>
+            <a:r>
+              <a:rPr lang="en-US" dirty="0">
+                <a:solidFill>
+                  <a:schemeClr val="bg1"/>
+                </a:solidFill>
+              </a:rPr>
+              <a:t>GIT URL: </a:t>
+            </a:r>
+            <a:r>
+              <a:rPr lang="en-US" u="sng" dirty="0">
+                <a:solidFill>
+                  <a:schemeClr val="bg1"/>
+                </a:solidFill>
+              </a:rPr>
+              <a:t>https://github.com/Snehashish30/NLP_chatbot</a:t>
+            </a:r>
+          </a:p>
+          <a:p>
+            <a:endParaRPr lang="en-US" dirty="0">
+              <a:solidFill>
+                <a:schemeClr val="bg1"/>
+              </a:solidFill>
+            </a:endParaRPr>
+          </a:p>
+          <a:p>
+            <a:r>
+              <a:rPr lang="en-US" dirty="0">
+                <a:solidFill>
+                  <a:schemeClr val="bg1"/>
+                </a:solidFill>
+              </a:rPr>
+              <a:t>Compile Instructions: </a:t>
+            </a:r>
+            <a:r>
+              <a:rPr lang="en-US" u="sng" dirty="0">
+                <a:solidFill>
+                  <a:schemeClr val="bg1"/>
+                </a:solidFill>
+                <a:hlinkClick r:id="rId4" action="ppaction://hlinkfile"/>
+              </a:rPr>
+              <a:t>Compile Instruction file</a:t>
+            </a:r>
+            <a:endParaRPr lang="en-US" u="sng" dirty="0">
+              <a:solidFill>
+                <a:schemeClr val="bg1"/>
+              </a:solidFill>
+            </a:endParaRPr>
+          </a:p>
+          <a:p>
+            <a:endParaRPr lang="en-US" dirty="0">
+              <a:solidFill>
+                <a:schemeClr val="bg1"/>
+              </a:solidFill>
+            </a:endParaRPr>
+          </a:p>
+          <a:p>
+            <a:endParaRPr lang="en-US" dirty="0">
+              <a:solidFill>
+                <a:schemeClr val="bg1"/>
+              </a:solidFill>
+            </a:endParaRPr>
+          </a:p>
+          <a:p>
+            <a:endParaRPr lang="en-US" dirty="0">
+              <a:solidFill>
+                <a:schemeClr val="bg1"/>
+              </a:solidFill>
+            </a:endParaRPr>
+          </a:p>
+          <a:p>
+            <a:endParaRPr lang="en-US" dirty="0">
+              <a:solidFill>
+                <a:schemeClr val="bg1"/>
+              </a:solidFill>
+            </a:endParaRPr>
+          </a:p>
+          <a:p>
+            <a:endParaRPr lang="en-US" dirty="0">
+              <a:solidFill>
+                <a:schemeClr val="bg1"/>
+              </a:solidFill>
+            </a:endParaRPr>
+          </a:p>
+          <a:p>
+            <a:endParaRPr lang="en-US" dirty="0">
+              <a:solidFill>
+                <a:schemeClr val="bg1"/>
+              </a:solidFill>
+            </a:endParaRPr>
+          </a:p>
+          <a:p>
+            <a:endParaRPr lang="en-US" dirty="0">
+              <a:solidFill>
+                <a:schemeClr val="bg1"/>
+              </a:solidFill>
+            </a:endParaRPr>
+          </a:p>
+          <a:p>
+            <a:endParaRPr lang="en-US" dirty="0">
+              <a:solidFill>
+                <a:schemeClr val="bg1"/>
+              </a:solidFill>
+            </a:endParaRPr>
+          </a:p>
+          <a:p>
+            <a:endParaRPr lang="en-US" dirty="0">
+              <a:solidFill>
+                <a:schemeClr val="bg1"/>
+              </a:solidFill>
+            </a:endParaRPr>
+          </a:p>
+          <a:p>
+            <a:endParaRPr lang="en-US" dirty="0">
+              <a:solidFill>
+                <a:schemeClr val="bg1"/>
+              </a:solidFill>
+            </a:endParaRPr>
+          </a:p>
+          <a:p>
+            <a:endParaRPr lang="en-US" dirty="0">
+              <a:solidFill>
+                <a:schemeClr val="bg1"/>
+              </a:solidFill>
+            </a:endParaRPr>
+          </a:p>
+          <a:p>
+            <a:pPr algn="ctr"/>
+            <a:endParaRPr lang="en-US" dirty="0">
+              <a:solidFill>
+                <a:schemeClr val="bg1"/>
+              </a:solidFill>
+            </a:endParaRPr>
+          </a:p>
+        </p:txBody>
+      </p:sp>
+    </p:spTree>
+    <p:extLst>
+      <p:ext uri="{BB962C8B-B14F-4D97-AF65-F5344CB8AC3E}">
+        <p14:creationId xmlns:p14="http://schemas.microsoft.com/office/powerpoint/2010/main" val="29856360"/>
+      </p:ext>
+    </p:extLst>
+  </p:cSld>
+  <p:clrMapOvr>
+    <a:masterClrMapping/>
+  </p:clrMapOvr>
+</p:sld>
+</file>
+
+<file path=ppt/slides/slide13.xml><?xml version="1.0" encoding="utf-8"?>
+<p:sld xmlns:a="http://schemas.openxmlformats.org/drawingml/2006/main" xmlns:r="http://schemas.openxmlformats.org/officeDocument/2006/relationships" xmlns:p="http://schemas.openxmlformats.org/presentationml/2006/main">
+  <p:cSld>
+    <p:spTree>
+      <p:nvGrpSpPr>
+        <p:cNvPr id="1" name="Shape 157"/>
+        <p:cNvGrpSpPr/>
+        <p:nvPr/>
+      </p:nvGrpSpPr>
+      <p:grpSpPr>
+        <a:xfrm>
+          <a:off x="0" y="0"/>
+          <a:ext cx="0" cy="0"/>
+          <a:chOff x="0" y="0"/>
+          <a:chExt cx="0" cy="0"/>
+        </a:xfrm>
+      </p:grpSpPr>
+      <p:sp>
+        <p:nvSpPr>
+          <p:cNvPr id="158" name="Shape 158"/>
+          <p:cNvSpPr/>
+          <p:nvPr/>
+        </p:nvSpPr>
+        <p:spPr>
+          <a:xfrm>
+            <a:off x="503640" y="791640"/>
+            <a:ext cx="9138240" cy="4962600"/>
+          </a:xfrm>
+          <a:prstGeom prst="rect">
+            <a:avLst/>
+          </a:prstGeom>
+          <a:solidFill>
+            <a:srgbClr val="2F0E3C"/>
+          </a:solidFill>
+          <a:ln>
+            <a:noFill/>
+          </a:ln>
+        </p:spPr>
+        <p:txBody>
+          <a:bodyPr spcFirstLastPara="1" wrap="square" lIns="91425" tIns="91425" rIns="91425" bIns="91425" anchor="ctr" anchorCtr="0">
+            <a:noAutofit/>
+          </a:bodyPr>
+          <a:lstStyle/>
+          <a:p>
+            <a:pPr marL="0" lvl="0" indent="0">
+              <a:spcBef>
+                <a:spcPts val="0"/>
+              </a:spcBef>
+              <a:spcAft>
+                <a:spcPts val="0"/>
+              </a:spcAft>
+              <a:buNone/>
+            </a:pPr>
+            <a:endParaRPr/>
+          </a:p>
+        </p:txBody>
+      </p:sp>
+      <p:sp>
+        <p:nvSpPr>
+          <p:cNvPr id="159" name="Shape 159"/>
+          <p:cNvSpPr/>
+          <p:nvPr/>
+        </p:nvSpPr>
+        <p:spPr>
+          <a:xfrm>
+            <a:off x="647640" y="903240"/>
             <a:ext cx="8864660" cy="836660"/>
           </a:xfrm>
           <a:prstGeom prst="rect">
@@ -15179,7 +15833,7 @@
           <p:nvPr>
             <p:extLst>
               <p:ext uri="{D42A27DB-BD31-4B8C-83A1-F6EECF244321}">
-                <p14:modId xmlns:p14="http://schemas.microsoft.com/office/powerpoint/2010/main" val="1873750008"/>
+                <p14:modId xmlns:p14="http://schemas.microsoft.com/office/powerpoint/2010/main" val="3625520486"/>
               </p:ext>
             </p:extLst>
           </p:nvPr>
@@ -15279,7 +15933,7 @@
                     <a:p>
                       <a:r>
                         <a:rPr lang="en-US" dirty="0"/>
-                        <a:t>No of Output Questions matching with the output of this system.</a:t>
+                        <a:t>8 out of 9 Output Questions matching with the output of this system.</a:t>
                       </a:r>
                     </a:p>
                   </a:txBody>
@@ -15431,7 +16085,7 @@
 </p:sld>
 </file>
 
-<file path=ppt/slides/slide13.xml><?xml version="1.0" encoding="utf-8"?>
+<file path=ppt/slides/slide14.xml><?xml version="1.0" encoding="utf-8"?>
 <p:sld xmlns:a="http://schemas.openxmlformats.org/drawingml/2006/main" xmlns:r="http://schemas.openxmlformats.org/officeDocument/2006/relationships" xmlns:p="http://schemas.openxmlformats.org/presentationml/2006/main">
   <p:cSld>
     <p:spTree>
@@ -15656,7 +16310,7 @@
         <p:spPr>
           <a:xfrm>
             <a:off x="800100" y="2082960"/>
-            <a:ext cx="8699500" cy="3539430"/>
+            <a:ext cx="8699500" cy="523220"/>
           </a:xfrm>
           <a:prstGeom prst="rect">
             <a:avLst/>
@@ -15669,116 +16323,22 @@
           </a:bodyPr>
           <a:lstStyle/>
           <a:p>
-            <a:pPr algn="ctr"/>
             <a:r>
               <a:rPr lang="en-US" dirty="0">
                 <a:solidFill>
                   <a:schemeClr val="bg1"/>
                 </a:solidFill>
               </a:rPr>
-              <a:t>Add Text here</a:t>
+              <a:t>Sentiment Analysis can be done to improve the interactivity of the chatbot by learning on more of </a:t>
             </a:r>
-          </a:p>
-          <a:p>
-            <a:endParaRPr lang="en-US" dirty="0">
-              <a:solidFill>
-                <a:schemeClr val="bg1"/>
-              </a:solidFill>
-            </a:endParaRPr>
-          </a:p>
-          <a:p>
-            <a:endParaRPr lang="en-US" dirty="0">
-              <a:solidFill>
-                <a:schemeClr val="bg1"/>
-              </a:solidFill>
-            </a:endParaRPr>
-          </a:p>
-          <a:p>
-            <a:endParaRPr lang="en-US" dirty="0">
-              <a:solidFill>
-                <a:schemeClr val="bg1"/>
-              </a:solidFill>
-            </a:endParaRPr>
-          </a:p>
-          <a:p>
-            <a:endParaRPr lang="en-US" dirty="0">
-              <a:solidFill>
-                <a:schemeClr val="bg1"/>
-              </a:solidFill>
-            </a:endParaRPr>
-          </a:p>
-          <a:p>
-            <a:endParaRPr lang="en-US" dirty="0">
-              <a:solidFill>
-                <a:schemeClr val="bg1"/>
-              </a:solidFill>
-            </a:endParaRPr>
-          </a:p>
-          <a:p>
-            <a:endParaRPr lang="en-US" dirty="0">
-              <a:solidFill>
-                <a:schemeClr val="bg1"/>
-              </a:solidFill>
-            </a:endParaRPr>
-          </a:p>
-          <a:p>
-            <a:endParaRPr lang="en-US" dirty="0">
-              <a:solidFill>
-                <a:schemeClr val="bg1"/>
-              </a:solidFill>
-            </a:endParaRPr>
-          </a:p>
-          <a:p>
-            <a:endParaRPr lang="en-US" dirty="0">
-              <a:solidFill>
-                <a:schemeClr val="bg1"/>
-              </a:solidFill>
-            </a:endParaRPr>
-          </a:p>
-          <a:p>
-            <a:endParaRPr lang="en-US" dirty="0">
-              <a:solidFill>
-                <a:schemeClr val="bg1"/>
-              </a:solidFill>
-            </a:endParaRPr>
-          </a:p>
-          <a:p>
-            <a:endParaRPr lang="en-US" dirty="0">
-              <a:solidFill>
-                <a:schemeClr val="bg1"/>
-              </a:solidFill>
-            </a:endParaRPr>
-          </a:p>
-          <a:p>
-            <a:endParaRPr lang="en-US" dirty="0">
-              <a:solidFill>
-                <a:schemeClr val="bg1"/>
-              </a:solidFill>
-            </a:endParaRPr>
-          </a:p>
-          <a:p>
-            <a:endParaRPr lang="en-US" dirty="0">
-              <a:solidFill>
-                <a:schemeClr val="bg1"/>
-              </a:solidFill>
-            </a:endParaRPr>
-          </a:p>
-          <a:p>
-            <a:endParaRPr lang="en-US" dirty="0">
-              <a:solidFill>
-                <a:schemeClr val="bg1"/>
-              </a:solidFill>
-            </a:endParaRPr>
-          </a:p>
-          <a:p>
-            <a:endParaRPr lang="en-US" dirty="0">
-              <a:solidFill>
-                <a:schemeClr val="bg1"/>
-              </a:solidFill>
-            </a:endParaRPr>
-          </a:p>
-          <a:p>
-            <a:pPr algn="ctr"/>
+            <a:r>
+              <a:rPr lang="en-US">
+                <a:solidFill>
+                  <a:schemeClr val="bg1"/>
+                </a:solidFill>
+              </a:rPr>
+              <a:t>casual intents.</a:t>
+            </a:r>
             <a:endParaRPr lang="en-US" dirty="0">
               <a:solidFill>
                 <a:schemeClr val="bg1"/>
@@ -15795,7 +16355,7 @@
 </p:sld>
 </file>
 
-<file path=ppt/slides/slide14.xml><?xml version="1.0" encoding="utf-8"?>
+<file path=ppt/slides/slide15.xml><?xml version="1.0" encoding="utf-8"?>
 <p:sld xmlns:a="http://schemas.openxmlformats.org/drawingml/2006/main" xmlns:r="http://schemas.openxmlformats.org/officeDocument/2006/relationships" xmlns:p="http://schemas.openxmlformats.org/presentationml/2006/main">
   <p:cSld>
     <p:spTree>
@@ -16230,7 +16790,7 @@
               <a:buNone/>
             </a:pPr>
             <a:r>
-              <a:rPr lang="en-IN" sz="3600" b="1" i="0" u="none" strike="noStrike" cap="none" dirty="0">
+              <a:rPr lang="en-US" sz="3600" b="1" i="0" u="none" strike="noStrike" cap="none" dirty="0">
                 <a:solidFill>
                   <a:srgbClr val="FFFFFF"/>
                 </a:solidFill>
@@ -16239,79 +16799,8 @@
                 <a:cs typeface="Arial"/>
                 <a:sym typeface="Arial"/>
               </a:rPr>
-              <a:t>About You</a:t>
+              <a:t>Snehashish Paul</a:t>
             </a:r>
-          </a:p>
-          <a:p>
-            <a:r>
-              <a:rPr lang="en-IN" dirty="0">
-                <a:solidFill>
-                  <a:srgbClr val="FFFFFF"/>
-                </a:solidFill>
-              </a:rPr>
-              <a:t>A few words about you. What do you do, Where do you work, what are your interests..</a:t>
-            </a:r>
-            <a:endParaRPr lang="en-IN" dirty="0"/>
-          </a:p>
-          <a:p>
-            <a:pPr marL="0" marR="0" lvl="0" indent="0" algn="l" rtl="0">
-              <a:lnSpc>
-                <a:spcPct val="100000"/>
-              </a:lnSpc>
-              <a:spcBef>
-                <a:spcPts val="0"/>
-              </a:spcBef>
-              <a:spcAft>
-                <a:spcPts val="0"/>
-              </a:spcAft>
-              <a:buNone/>
-            </a:pPr>
-            <a:endParaRPr sz="1800" b="0" i="0" u="none" strike="noStrike" cap="none" dirty="0">
-              <a:solidFill>
-                <a:srgbClr val="000000"/>
-              </a:solidFill>
-              <a:latin typeface="Arial"/>
-              <a:ea typeface="Arial"/>
-              <a:cs typeface="Arial"/>
-              <a:sym typeface="Arial"/>
-            </a:endParaRPr>
-          </a:p>
-          <a:p>
-            <a:pPr marL="0" marR="0" lvl="0" indent="0" algn="ctr" rtl="0">
-              <a:lnSpc>
-                <a:spcPct val="42000"/>
-              </a:lnSpc>
-              <a:spcBef>
-                <a:spcPts val="0"/>
-              </a:spcBef>
-              <a:spcAft>
-                <a:spcPts val="0"/>
-              </a:spcAft>
-              <a:buNone/>
-            </a:pPr>
-            <a:endParaRPr sz="1800" b="0" i="0" u="none" strike="noStrike" cap="none" dirty="0">
-              <a:solidFill>
-                <a:srgbClr val="000000"/>
-              </a:solidFill>
-              <a:latin typeface="Arial"/>
-              <a:ea typeface="Arial"/>
-              <a:cs typeface="Arial"/>
-              <a:sym typeface="Arial"/>
-            </a:endParaRPr>
-          </a:p>
-          <a:p>
-            <a:pPr marL="0" marR="0" lvl="0" indent="0" algn="ctr" rtl="0">
-              <a:lnSpc>
-                <a:spcPct val="54000"/>
-              </a:lnSpc>
-              <a:spcBef>
-                <a:spcPts val="0"/>
-              </a:spcBef>
-              <a:spcAft>
-                <a:spcPts val="0"/>
-              </a:spcAft>
-              <a:buNone/>
-            </a:pPr>
             <a:endParaRPr sz="1800" b="0" i="0" u="none" strike="noStrike" cap="none" dirty="0">
               <a:solidFill>
                 <a:srgbClr val="000000"/>
@@ -16360,7 +16849,7 @@
         <p:spPr>
           <a:xfrm>
             <a:off x="800100" y="2082960"/>
-            <a:ext cx="8699500" cy="3539430"/>
+            <a:ext cx="8699500" cy="4401205"/>
           </a:xfrm>
           <a:prstGeom prst="rect">
             <a:avLst/>
@@ -16373,15 +16862,40 @@
           </a:bodyPr>
           <a:lstStyle/>
           <a:p>
-            <a:pPr algn="ctr"/>
             <a:r>
               <a:rPr lang="en-US" dirty="0">
                 <a:solidFill>
                   <a:schemeClr val="bg1"/>
                 </a:solidFill>
               </a:rPr>
-              <a:t>Add Text here</a:t>
+              <a:t>I am software engineer with 4 years of experience in developing application using C++, </a:t>
             </a:r>
+            <a:r>
+              <a:rPr lang="en-US" dirty="0" err="1">
+                <a:solidFill>
+                  <a:schemeClr val="bg1"/>
+                </a:solidFill>
+              </a:rPr>
+              <a:t>sql</a:t>
+            </a:r>
+            <a:r>
+              <a:rPr lang="en-US" dirty="0">
+                <a:solidFill>
+                  <a:schemeClr val="bg1"/>
+                </a:solidFill>
+              </a:rPr>
+              <a:t> and other programming languages. Currently I am working in Scientific Games as a game developer using UNITY.</a:t>
+            </a:r>
+          </a:p>
+          <a:p>
+            <a:r>
+              <a:rPr lang="en-US" dirty="0">
+                <a:solidFill>
+                  <a:schemeClr val="bg1"/>
+                </a:solidFill>
+              </a:rPr>
+              <a:t>I am also pursuing a PG diploma online course from IIIIT Bangalore on Data Science and Machine learning.</a:t>
+            </a:r>
           </a:p>
           <a:p>
             <a:endParaRPr lang="en-US" dirty="0">
@@ -16389,6 +16903,16 @@
                 <a:schemeClr val="bg1"/>
               </a:solidFill>
             </a:endParaRPr>
+          </a:p>
+          <a:p>
+            <a:r>
+              <a:rPr lang="en-US" dirty="0">
+                <a:solidFill>
+                  <a:schemeClr val="bg1"/>
+                </a:solidFill>
+              </a:rPr>
+              <a:t>I take interest in learning new things and applying my ideas to solve business challenges. I am a quick learner and was always among the top performers in my academics and professional career. </a:t>
+            </a:r>
           </a:p>
           <a:p>
             <a:endParaRPr lang="en-US" dirty="0">
@@ -16870,7 +17394,7 @@
         <p:spPr>
           <a:xfrm>
             <a:off x="800100" y="2082960"/>
-            <a:ext cx="8699500" cy="3970318"/>
+            <a:ext cx="8699500" cy="5909310"/>
           </a:xfrm>
           <a:prstGeom prst="rect">
             <a:avLst/>
@@ -16889,7 +17413,7 @@
                   <a:schemeClr val="bg1"/>
                 </a:solidFill>
               </a:rPr>
-              <a:t>The IT team of the organization is getting lot of IT issues. The turn around time is more which is impacting the productivity of the organization. However it has been seen that many of the issues are frequent and repetitive.</a:t>
+              <a:t>ABC corp, which provides L1 and L2 IT support and services to its client is facing a new challenge in their operations. There has been a multifold increase in ticket arrival from their client and the team is not able to provide solution within SLA. </a:t>
             </a:r>
           </a:p>
           <a:p>
@@ -16898,6 +17422,33 @@
                 <a:schemeClr val="bg1"/>
               </a:solidFill>
             </a:endParaRPr>
+          </a:p>
+          <a:p>
+            <a:r>
+              <a:rPr lang="en-US" dirty="0">
+                <a:solidFill>
+                  <a:schemeClr val="bg1"/>
+                </a:solidFill>
+              </a:rPr>
+              <a:t>The root problem is the whole operation is purely manual and thus for every ticket, a support agent either needs to look previous closed tickets or manuals to find the solutions even though a majority of the new tickets/issues are similar to past ones.</a:t>
+            </a:r>
+          </a:p>
+          <a:p>
+            <a:endParaRPr lang="en-US" dirty="0">
+              <a:solidFill>
+                <a:schemeClr val="bg1"/>
+              </a:solidFill>
+            </a:endParaRPr>
+          </a:p>
+          <a:p>
+            <a:r>
+              <a:rPr lang="en-US" dirty="0">
+                <a:solidFill>
+                  <a:schemeClr val="bg1"/>
+                </a:solidFill>
+              </a:rPr>
+              <a:t>Company wants to automate this ticket resolution by implementing NLP based text mining technology to find solutions to tickets that are similar to previous tickets and provide instant and interactive solutions to the client. Only the tickets that are completely new issues must be assigned to L1 agent to reduce their workload. Whenever the new issue is updated with a correct solution, the model must learn and produce the solution to upcoming tickets of similar nature.</a:t>
+            </a:r>
           </a:p>
           <a:p>
             <a:endParaRPr lang="en-US" dirty="0">
@@ -17369,7 +17920,7 @@
         <p:spPr>
           <a:xfrm>
             <a:off x="800100" y="2082960"/>
-            <a:ext cx="8699500" cy="3539430"/>
+            <a:ext cx="8699500" cy="6340197"/>
           </a:xfrm>
           <a:prstGeom prst="rect">
             <a:avLst/>
@@ -17388,15 +17939,210 @@
                   <a:schemeClr val="bg1"/>
                 </a:solidFill>
               </a:rPr>
-              <a:t>The Idea is to automate the task of ticket resolution where a system can understand the main problem and can </a:t>
+              <a:t>      </a:t>
             </a:r>
-          </a:p>
-          <a:p>
+            <a:r>
+              <a:rPr lang="en-US" sz="1600" b="1" dirty="0">
+                <a:solidFill>
+                  <a:schemeClr val="bg1"/>
+                </a:solidFill>
+              </a:rPr>
+              <a:t>INTUITION</a:t>
+            </a:r>
+          </a:p>
+          <a:p>
+            <a:pPr marL="285750" indent="-285750">
+              <a:buFont typeface="Arial" panose="020B0604020202020204" pitchFamily="34" charset="0"/>
+              <a:buChar char="•"/>
+            </a:pPr>
+            <a:r>
+              <a:rPr lang="en-US" dirty="0">
+                <a:solidFill>
+                  <a:schemeClr val="bg1"/>
+                </a:solidFill>
+              </a:rPr>
+              <a:t>Every problem ticket is composed of 2 key components, entity and intent. </a:t>
+            </a:r>
+          </a:p>
+          <a:p>
+            <a:pPr marL="285750" indent="-285750">
+              <a:buFont typeface="Arial" panose="020B0604020202020204" pitchFamily="34" charset="0"/>
+              <a:buChar char="•"/>
+            </a:pPr>
+            <a:r>
+              <a:rPr lang="en-US" dirty="0">
+                <a:solidFill>
+                  <a:schemeClr val="bg1"/>
+                </a:solidFill>
+              </a:rPr>
+              <a:t>Intent is the intention of the user. These are usually the verbs in the problem.</a:t>
+            </a:r>
+          </a:p>
+          <a:p>
+            <a:pPr marL="285750" indent="-285750">
+              <a:buFont typeface="Arial" panose="020B0604020202020204" pitchFamily="34" charset="0"/>
+              <a:buChar char="•"/>
+            </a:pPr>
+            <a:r>
+              <a:rPr lang="en-US" dirty="0">
+                <a:solidFill>
+                  <a:schemeClr val="bg1"/>
+                </a:solidFill>
+              </a:rPr>
+              <a:t>Entity is the main Business metadata or the subject of the issue. These are usually the nouns. </a:t>
+            </a:r>
+          </a:p>
+          <a:p>
+            <a:pPr marL="285750" lvl="1" indent="-285750">
+              <a:buFont typeface="Arial" panose="020B0604020202020204" pitchFamily="34" charset="0"/>
+              <a:buChar char="•"/>
+            </a:pPr>
+            <a:r>
+              <a:rPr lang="en-US" dirty="0">
+                <a:solidFill>
+                  <a:schemeClr val="bg1"/>
+                </a:solidFill>
+              </a:rPr>
+              <a:t>	</a:t>
+            </a:r>
+            <a:r>
+              <a:rPr lang="en-US" dirty="0" err="1">
+                <a:solidFill>
+                  <a:schemeClr val="bg1"/>
+                </a:solidFill>
+              </a:rPr>
+              <a:t>Eg</a:t>
+            </a:r>
+            <a:r>
+              <a:rPr lang="en-US" dirty="0">
+                <a:solidFill>
+                  <a:schemeClr val="bg1"/>
+                </a:solidFill>
+              </a:rPr>
+              <a:t>: Email is not working. Here Email is the entity and working is the intent.</a:t>
+            </a:r>
+          </a:p>
+          <a:p>
+            <a:pPr marL="285750" lvl="1" indent="-285750">
+              <a:buFont typeface="Arial" panose="020B0604020202020204" pitchFamily="34" charset="0"/>
+              <a:buChar char="•"/>
+            </a:pPr>
+            <a:r>
+              <a:rPr lang="en-US" dirty="0">
+                <a:solidFill>
+                  <a:schemeClr val="bg1"/>
+                </a:solidFill>
+              </a:rPr>
+              <a:t>Accurate identification of the entities and intents from the problem ticket and matching with old resolved queries/ FAQ/manual is the key to find the closest match and provide the solution.</a:t>
+            </a:r>
+          </a:p>
+          <a:p>
+            <a:pPr marL="285750" lvl="1" indent="-285750">
+              <a:buFont typeface="Arial" panose="020B0604020202020204" pitchFamily="34" charset="0"/>
+              <a:buChar char="•"/>
+            </a:pPr>
             <a:endParaRPr lang="en-US" dirty="0">
               <a:solidFill>
                 <a:schemeClr val="bg1"/>
               </a:solidFill>
             </a:endParaRPr>
+          </a:p>
+          <a:p>
+            <a:pPr lvl="1"/>
+            <a:r>
+              <a:rPr lang="en-US" dirty="0">
+                <a:solidFill>
+                  <a:schemeClr val="bg1"/>
+                </a:solidFill>
+              </a:rPr>
+              <a:t>      </a:t>
+            </a:r>
+            <a:r>
+              <a:rPr lang="en-US" sz="1600" b="1" dirty="0">
+                <a:solidFill>
+                  <a:schemeClr val="bg1"/>
+                </a:solidFill>
+              </a:rPr>
+              <a:t>IMPLEMENTATION</a:t>
+            </a:r>
+            <a:r>
+              <a:rPr lang="en-US" dirty="0">
+                <a:solidFill>
+                  <a:schemeClr val="bg1"/>
+                </a:solidFill>
+              </a:rPr>
+              <a:t> </a:t>
+            </a:r>
+          </a:p>
+          <a:p>
+            <a:pPr marL="285750" indent="-285750">
+              <a:buFont typeface="Arial" panose="020B0604020202020204" pitchFamily="34" charset="0"/>
+              <a:buChar char="•"/>
+            </a:pPr>
+            <a:r>
+              <a:rPr lang="en-US" dirty="0">
+                <a:solidFill>
+                  <a:schemeClr val="bg1"/>
+                </a:solidFill>
+              </a:rPr>
+              <a:t>Prepared a question set based on FAQ documents for start.</a:t>
+            </a:r>
+          </a:p>
+          <a:p>
+            <a:pPr marL="285750" indent="-285750">
+              <a:buFont typeface="Arial" panose="020B0604020202020204" pitchFamily="34" charset="0"/>
+              <a:buChar char="•"/>
+            </a:pPr>
+            <a:r>
+              <a:rPr lang="en-US" dirty="0">
+                <a:solidFill>
+                  <a:schemeClr val="bg1"/>
+                </a:solidFill>
+              </a:rPr>
+              <a:t>Created a list of possible IT keywords(entities) &amp; a list of intents(verbs) based on the FAQ questions.</a:t>
+            </a:r>
+          </a:p>
+          <a:p>
+            <a:pPr marL="285750" indent="-285750">
+              <a:buFont typeface="Arial" panose="020B0604020202020204" pitchFamily="34" charset="0"/>
+              <a:buChar char="•"/>
+            </a:pPr>
+            <a:r>
+              <a:rPr lang="en-US" dirty="0">
+                <a:solidFill>
+                  <a:schemeClr val="bg1"/>
+                </a:solidFill>
+              </a:rPr>
+              <a:t>Created a bag of words model on the FAQ questions for entity &amp; intent labelling  using NLP algorithms.</a:t>
+            </a:r>
+          </a:p>
+          <a:p>
+            <a:pPr marL="285750" indent="-285750">
+              <a:buFont typeface="Arial" panose="020B0604020202020204" pitchFamily="34" charset="0"/>
+              <a:buChar char="•"/>
+            </a:pPr>
+            <a:r>
+              <a:rPr lang="en-US" dirty="0">
+                <a:solidFill>
+                  <a:schemeClr val="bg1"/>
+                </a:solidFill>
+              </a:rPr>
+              <a:t>Performed multiclass labelling of the FAQ questions as per the available labels.</a:t>
+            </a:r>
+          </a:p>
+          <a:p>
+            <a:pPr marL="285750" indent="-285750">
+              <a:buFont typeface="Arial" panose="020B0604020202020204" pitchFamily="34" charset="0"/>
+              <a:buChar char="•"/>
+            </a:pPr>
+            <a:r>
+              <a:rPr lang="en-US" dirty="0">
+                <a:solidFill>
+                  <a:schemeClr val="bg1"/>
+                </a:solidFill>
+              </a:rPr>
+              <a:t>For new problems where model is not able to provide solution, the ticket is assigned to human. When a solution is provided the problem is properly tagged with new entities and intents and saved for re training the model to learn the new problems and its solution</a:t>
+            </a:r>
           </a:p>
           <a:p>
             <a:endParaRPr lang="en-US" dirty="0">
@@ -17510,7 +18256,7 @@
   <p:cSld>
     <p:spTree>
       <p:nvGrpSpPr>
-        <p:cNvPr id="1" name="Shape 136"/>
+        <p:cNvPr id="1" name="Shape 122"/>
         <p:cNvGrpSpPr/>
         <p:nvPr/>
       </p:nvGrpSpPr>
@@ -17524,13 +18270,13 @@
       </p:grpSpPr>
       <p:sp>
         <p:nvSpPr>
-          <p:cNvPr id="137" name="Shape 137"/>
+          <p:cNvPr id="123" name="Shape 123"/>
           <p:cNvSpPr/>
           <p:nvPr/>
         </p:nvSpPr>
         <p:spPr>
           <a:xfrm>
-            <a:off x="503640" y="755640"/>
+            <a:off x="503640" y="791640"/>
             <a:ext cx="9138240" cy="4962600"/>
           </a:xfrm>
           <a:prstGeom prst="rect">
@@ -17690,14 +18436,14 @@
       </p:sp>
       <p:sp>
         <p:nvSpPr>
-          <p:cNvPr id="138" name="Shape 138"/>
+          <p:cNvPr id="124" name="Shape 124"/>
           <p:cNvSpPr/>
           <p:nvPr/>
         </p:nvSpPr>
         <p:spPr>
           <a:xfrm>
             <a:off x="647640" y="903240"/>
-            <a:ext cx="8864660" cy="925560"/>
+            <a:ext cx="7766640" cy="1179720"/>
           </a:xfrm>
           <a:prstGeom prst="rect">
             <a:avLst/>
@@ -17726,6 +18472,14 @@
               <a:buNone/>
             </a:pPr>
             <a:r>
+              <a:rPr lang="en-IN" sz="3600" b="1" dirty="0">
+                <a:solidFill>
+                  <a:srgbClr val="FFFFFF"/>
+                </a:solidFill>
+              </a:rPr>
+              <a:t>Implementation</a:t>
+            </a:r>
+            <a:r>
               <a:rPr lang="en-IN" sz="3600" b="1" i="0" u="none" strike="noStrike" cap="none" dirty="0">
                 <a:solidFill>
                   <a:srgbClr val="FFFFFF"/>
@@ -17735,7 +18489,7 @@
                 <a:cs typeface="Arial"/>
                 <a:sym typeface="Arial"/>
               </a:rPr>
-              <a:t>Technology/Tool/Components used</a:t>
+              <a:t> continued</a:t>
             </a:r>
           </a:p>
           <a:p>
@@ -17745,7 +18499,7 @@
                   <a:srgbClr val="FFFFFF"/>
                 </a:solidFill>
               </a:rPr>
-              <a:t>Explain the Technologies, Languages used in your solution.</a:t>
+              <a:t>Explain the solution submitted in your words</a:t>
             </a:r>
             <a:endParaRPr lang="en-IN" dirty="0"/>
           </a:p>
@@ -17762,6 +18516,26 @@
               </a:spcAft>
               <a:buNone/>
             </a:pPr>
+            <a:endParaRPr b="0" i="0" u="none" strike="noStrike" cap="none" dirty="0">
+              <a:solidFill>
+                <a:srgbClr val="000000"/>
+              </a:solidFill>
+              <a:sym typeface="Arial"/>
+            </a:endParaRPr>
+          </a:p>
+          <a:p>
+            <a:pPr marL="0" marR="0" lvl="0" indent="0" algn="ctr" rtl="0">
+              <a:lnSpc>
+                <a:spcPct val="42000"/>
+              </a:lnSpc>
+              <a:spcBef>
+                <a:spcPts val="0"/>
+              </a:spcBef>
+              <a:spcAft>
+                <a:spcPts val="0"/>
+              </a:spcAft>
+              <a:buNone/>
+            </a:pPr>
             <a:endParaRPr sz="1800" b="0" i="0" u="none" strike="noStrike" cap="none" dirty="0">
               <a:solidFill>
                 <a:srgbClr val="000000"/>
@@ -17775,7 +18549,7 @@
           <a:p>
             <a:pPr marL="0" marR="0" lvl="0" indent="0" algn="ctr" rtl="0">
               <a:lnSpc>
-                <a:spcPct val="42000"/>
+                <a:spcPct val="54000"/>
               </a:lnSpc>
               <a:spcBef>
                 <a:spcPts val="0"/>
@@ -17795,34 +18569,11 @@
               <a:sym typeface="Arial"/>
             </a:endParaRPr>
           </a:p>
-          <a:p>
-            <a:pPr marL="0" marR="0" lvl="0" indent="0" algn="ctr" rtl="0">
-              <a:lnSpc>
-                <a:spcPct val="54000"/>
-              </a:lnSpc>
-              <a:spcBef>
-                <a:spcPts val="0"/>
-              </a:spcBef>
-              <a:spcAft>
-                <a:spcPts val="0"/>
-              </a:spcAft>
-              <a:buNone/>
-            </a:pPr>
-            <a:endParaRPr sz="1800" b="0" i="0" u="none" strike="noStrike" cap="none" dirty="0">
-              <a:solidFill>
-                <a:srgbClr val="000000"/>
-              </a:solidFill>
-              <a:latin typeface="Arial"/>
-              <a:ea typeface="Arial"/>
-              <a:cs typeface="Arial"/>
-              <a:sym typeface="Arial"/>
-            </a:endParaRPr>
-          </a:p>
         </p:txBody>
       </p:sp>
       <p:pic>
         <p:nvPicPr>
-          <p:cNvPr id="139" name="Shape 139"/>
+          <p:cNvPr id="125" name="Shape 125"/>
           <p:cNvPicPr preferRelativeResize="0"/>
           <p:nvPr/>
         </p:nvPicPr>
@@ -17835,7 +18586,7 @@
         </p:blipFill>
         <p:spPr>
           <a:xfrm>
-            <a:off x="3888000" y="6782400"/>
+            <a:off x="3888000" y="6710400"/>
             <a:ext cx="2013480" cy="487080"/>
           </a:xfrm>
           <a:prstGeom prst="rect">
@@ -17856,7 +18607,7 @@
         <p:spPr>
           <a:xfrm>
             <a:off x="800100" y="2082960"/>
-            <a:ext cx="8699500" cy="4616648"/>
+            <a:ext cx="8699500" cy="4832092"/>
           </a:xfrm>
           <a:prstGeom prst="rect">
             <a:avLst/>
@@ -17875,7 +18626,15 @@
                   <a:schemeClr val="bg1"/>
                 </a:solidFill>
               </a:rPr>
-              <a:t>Technology Used: </a:t>
+              <a:t>      </a:t>
+            </a:r>
+            <a:r>
+              <a:rPr lang="en-US" sz="1600" b="1" dirty="0">
+                <a:solidFill>
+                  <a:schemeClr val="bg1"/>
+                </a:solidFill>
+              </a:rPr>
+              <a:t>Implementation</a:t>
             </a:r>
           </a:p>
           <a:p>
@@ -17889,7 +18648,7 @@
                   <a:schemeClr val="bg1"/>
                 </a:solidFill>
               </a:rPr>
-              <a:t>Natural Language Processing</a:t>
+              <a:t>The query is tagged with its parts of speech to retrieve the entity which is the noun and the intent which is the verb in the query statement.</a:t>
             </a:r>
           </a:p>
           <a:p>
@@ -17903,7 +18662,7 @@
                   <a:schemeClr val="bg1"/>
                 </a:solidFill>
               </a:rPr>
-              <a:t>Machine Learning</a:t>
+              <a:t>The model matches the raised ticket issue with the existing queries and finds the closest match based on entity-intent pair. It is been observed that few issues are very common and usually have a common entity-intent pairs. The model ranks the solutions and interactively provides user the solutions.</a:t>
             </a:r>
           </a:p>
           <a:p>
@@ -17917,24 +18676,7 @@
                   <a:schemeClr val="bg1"/>
                 </a:solidFill>
               </a:rPr>
-              <a:t>Shiny for UI</a:t>
-            </a:r>
-          </a:p>
-          <a:p>
-            <a:endParaRPr lang="en-US" dirty="0">
-              <a:solidFill>
-                <a:schemeClr val="bg1"/>
-              </a:solidFill>
-            </a:endParaRPr>
-          </a:p>
-          <a:p>
-            <a:r>
-              <a:rPr lang="en-US" dirty="0">
-                <a:solidFill>
-                  <a:schemeClr val="bg1"/>
-                </a:solidFill>
-              </a:rPr>
-              <a:t>Language Used:</a:t>
+              <a:t>If the user selects the recommended solution, the solution is used for reinforcement learning and scoring for more effective recommendations.</a:t>
             </a:r>
           </a:p>
           <a:p>
@@ -17948,15 +18690,8 @@
                   <a:schemeClr val="bg1"/>
                 </a:solidFill>
               </a:rPr>
-              <a:t>R</a:t>
+              <a:t>Reinforcement learning  is done usually after a period of time to have a substantial amount of solutions.</a:t>
             </a:r>
-          </a:p>
-          <a:p>
-            <a:endParaRPr lang="en-US" dirty="0">
-              <a:solidFill>
-                <a:schemeClr val="bg1"/>
-              </a:solidFill>
-            </a:endParaRPr>
           </a:p>
           <a:p>
             <a:endParaRPr lang="en-US" dirty="0">
@@ -18053,6 +18788,11 @@
         </p:txBody>
       </p:sp>
     </p:spTree>
+    <p:extLst>
+      <p:ext uri="{BB962C8B-B14F-4D97-AF65-F5344CB8AC3E}">
+        <p14:creationId xmlns:p14="http://schemas.microsoft.com/office/powerpoint/2010/main" val="3237939354"/>
+      </p:ext>
+    </p:extLst>
   </p:cSld>
   <p:clrMapOvr>
     <a:masterClrMapping/>
@@ -18252,7 +18992,7 @@
         <p:spPr>
           <a:xfrm>
             <a:off x="647640" y="903240"/>
-            <a:ext cx="7766640" cy="887460"/>
+            <a:ext cx="8864660" cy="925560"/>
           </a:xfrm>
           <a:prstGeom prst="rect">
             <a:avLst/>
@@ -18281,7 +19021,7 @@
               <a:buNone/>
             </a:pPr>
             <a:r>
-              <a:rPr lang="en-US" sz="3600" b="1" i="0" u="none" strike="noStrike" cap="none" dirty="0">
+              <a:rPr lang="en-IN" sz="3600" b="1" i="0" u="none" strike="noStrike" cap="none" dirty="0">
                 <a:solidFill>
                   <a:srgbClr val="FFFFFF"/>
                 </a:solidFill>
@@ -18290,7 +19030,7 @@
                 <a:cs typeface="Arial"/>
                 <a:sym typeface="Arial"/>
               </a:rPr>
-              <a:t>Architecture overview</a:t>
+              <a:t>Technology/Tool/Components used</a:t>
             </a:r>
           </a:p>
           <a:p>
@@ -18300,7 +19040,7 @@
                   <a:srgbClr val="FFFFFF"/>
                 </a:solidFill>
               </a:rPr>
-              <a:t>Explain the Architecture you followed in your solution</a:t>
+              <a:t>Explain the Technologies, Languages used in your solution.</a:t>
             </a:r>
             <a:endParaRPr lang="en-IN" dirty="0"/>
           </a:p>
@@ -18317,10 +19057,13 @@
               </a:spcAft>
               <a:buNone/>
             </a:pPr>
-            <a:endParaRPr b="0" i="0" u="none" strike="noStrike" cap="none" dirty="0">
+            <a:endParaRPr sz="1800" b="0" i="0" u="none" strike="noStrike" cap="none" dirty="0">
               <a:solidFill>
                 <a:srgbClr val="000000"/>
               </a:solidFill>
+              <a:latin typeface="Arial"/>
+              <a:ea typeface="Arial"/>
+              <a:cs typeface="Arial"/>
               <a:sym typeface="Arial"/>
             </a:endParaRPr>
           </a:p>
@@ -18408,7 +19151,7 @@
         <p:spPr>
           <a:xfrm>
             <a:off x="800100" y="2082960"/>
-            <a:ext cx="8699500" cy="3539430"/>
+            <a:ext cx="8699500" cy="4832092"/>
           </a:xfrm>
           <a:prstGeom prst="rect">
             <a:avLst/>
@@ -18421,22 +19164,101 @@
           </a:bodyPr>
           <a:lstStyle/>
           <a:p>
-            <a:pPr algn="ctr"/>
             <a:r>
               <a:rPr lang="en-US" dirty="0">
                 <a:solidFill>
                   <a:schemeClr val="bg1"/>
                 </a:solidFill>
               </a:rPr>
-              <a:t>Add Text here</a:t>
+              <a:t>Technology Used: </a:t>
             </a:r>
           </a:p>
           <a:p>
+            <a:pPr marL="285750" indent="-285750">
+              <a:buFont typeface="Arial" panose="020B0604020202020204" pitchFamily="34" charset="0"/>
+              <a:buChar char="•"/>
+            </a:pPr>
+            <a:r>
+              <a:rPr lang="en-US" dirty="0">
+                <a:solidFill>
+                  <a:schemeClr val="bg1"/>
+                </a:solidFill>
+              </a:rPr>
+              <a:t>Natural Language Processing</a:t>
+            </a:r>
+          </a:p>
+          <a:p>
+            <a:pPr marL="285750" indent="-285750">
+              <a:buFont typeface="Arial" panose="020B0604020202020204" pitchFamily="34" charset="0"/>
+              <a:buChar char="•"/>
+            </a:pPr>
+            <a:r>
+              <a:rPr lang="en-US" dirty="0">
+                <a:solidFill>
+                  <a:schemeClr val="bg1"/>
+                </a:solidFill>
+              </a:rPr>
+              <a:t>Machine Learning</a:t>
+            </a:r>
+          </a:p>
+          <a:p>
+            <a:pPr marL="285750" indent="-285750">
+              <a:buFont typeface="Arial" panose="020B0604020202020204" pitchFamily="34" charset="0"/>
+              <a:buChar char="•"/>
+            </a:pPr>
+            <a:r>
+              <a:rPr lang="en-US" dirty="0">
+                <a:solidFill>
+                  <a:schemeClr val="bg1"/>
+                </a:solidFill>
+              </a:rPr>
+              <a:t>Shiny for UI</a:t>
+            </a:r>
+          </a:p>
+          <a:p>
             <a:endParaRPr lang="en-US" dirty="0">
               <a:solidFill>
                 <a:schemeClr val="bg1"/>
               </a:solidFill>
             </a:endParaRPr>
+          </a:p>
+          <a:p>
+            <a:r>
+              <a:rPr lang="en-US" dirty="0">
+                <a:solidFill>
+                  <a:schemeClr val="bg1"/>
+                </a:solidFill>
+              </a:rPr>
+              <a:t>Language Used:</a:t>
+            </a:r>
+          </a:p>
+          <a:p>
+            <a:pPr marL="285750" indent="-285750">
+              <a:buFont typeface="Arial" panose="020B0604020202020204" pitchFamily="34" charset="0"/>
+              <a:buChar char="•"/>
+            </a:pPr>
+            <a:r>
+              <a:rPr lang="en-US" dirty="0">
+                <a:solidFill>
+                  <a:schemeClr val="bg1"/>
+                </a:solidFill>
+              </a:rPr>
+              <a:t>R</a:t>
+            </a:r>
+          </a:p>
+          <a:p>
+            <a:pPr marL="285750" indent="-285750">
+              <a:buFont typeface="Arial" panose="020B0604020202020204" pitchFamily="34" charset="0"/>
+              <a:buChar char="•"/>
+            </a:pPr>
+            <a:r>
+              <a:rPr lang="en-US" dirty="0">
+                <a:solidFill>
+                  <a:schemeClr val="bg1"/>
+                </a:solidFill>
+              </a:rPr>
+              <a:t>R studio for IDE</a:t>
+            </a:r>
           </a:p>
           <a:p>
             <a:endParaRPr lang="en-US" dirty="0">
@@ -18536,6 +19358,1255 @@
                 <a:schemeClr val="bg1"/>
               </a:solidFill>
             </a:endParaRPr>
+          </a:p>
+        </p:txBody>
+      </p:sp>
+    </p:spTree>
+  </p:cSld>
+  <p:clrMapOvr>
+    <a:masterClrMapping/>
+  </p:clrMapOvr>
+</p:sld>
+</file>
+
+<file path=ppt/slides/slide7.xml><?xml version="1.0" encoding="utf-8"?>
+<p:sld xmlns:a="http://schemas.openxmlformats.org/drawingml/2006/main" xmlns:r="http://schemas.openxmlformats.org/officeDocument/2006/relationships" xmlns:p="http://schemas.openxmlformats.org/presentationml/2006/main">
+  <p:cSld>
+    <p:spTree>
+      <p:nvGrpSpPr>
+        <p:cNvPr id="1" name="Shape 136"/>
+        <p:cNvGrpSpPr/>
+        <p:nvPr/>
+      </p:nvGrpSpPr>
+      <p:grpSpPr>
+        <a:xfrm>
+          <a:off x="0" y="0"/>
+          <a:ext cx="0" cy="0"/>
+          <a:chOff x="0" y="0"/>
+          <a:chExt cx="0" cy="0"/>
+        </a:xfrm>
+      </p:grpSpPr>
+      <p:sp>
+        <p:nvSpPr>
+          <p:cNvPr id="137" name="Shape 137"/>
+          <p:cNvSpPr/>
+          <p:nvPr/>
+        </p:nvSpPr>
+        <p:spPr>
+          <a:xfrm>
+            <a:off x="320595" y="102525"/>
+            <a:ext cx="9138240" cy="7408190"/>
+          </a:xfrm>
+          <a:prstGeom prst="rect">
+            <a:avLst/>
+          </a:prstGeom>
+          <a:solidFill>
+            <a:srgbClr val="2F0E3C"/>
+          </a:solidFill>
+          <a:ln>
+            <a:noFill/>
+          </a:ln>
+        </p:spPr>
+        <p:txBody>
+          <a:bodyPr spcFirstLastPara="1" wrap="square" lIns="90000" tIns="45000" rIns="90000" bIns="45000" anchor="t" anchorCtr="0">
+            <a:noAutofit/>
+          </a:bodyPr>
+          <a:lstStyle/>
+          <a:p>
+            <a:pPr marL="0" marR="0" lvl="0" indent="0" algn="l" rtl="0">
+              <a:lnSpc>
+                <a:spcPct val="100000"/>
+              </a:lnSpc>
+              <a:spcBef>
+                <a:spcPts val="0"/>
+              </a:spcBef>
+              <a:spcAft>
+                <a:spcPts val="0"/>
+              </a:spcAft>
+              <a:buNone/>
+            </a:pPr>
+            <a:endParaRPr sz="1800" b="0" i="0" u="none" strike="noStrike" cap="none">
+              <a:solidFill>
+                <a:srgbClr val="000000"/>
+              </a:solidFill>
+              <a:latin typeface="Arial"/>
+              <a:ea typeface="Arial"/>
+              <a:cs typeface="Arial"/>
+              <a:sym typeface="Arial"/>
+            </a:endParaRPr>
+          </a:p>
+          <a:p>
+            <a:pPr marL="0" marR="0" lvl="0" indent="0" algn="l" rtl="0">
+              <a:lnSpc>
+                <a:spcPct val="100000"/>
+              </a:lnSpc>
+              <a:spcBef>
+                <a:spcPts val="0"/>
+              </a:spcBef>
+              <a:spcAft>
+                <a:spcPts val="0"/>
+              </a:spcAft>
+              <a:buNone/>
+            </a:pPr>
+            <a:endParaRPr sz="1800" b="0" i="0" u="none" strike="noStrike" cap="none">
+              <a:solidFill>
+                <a:srgbClr val="000000"/>
+              </a:solidFill>
+              <a:latin typeface="Arial"/>
+              <a:ea typeface="Arial"/>
+              <a:cs typeface="Arial"/>
+              <a:sym typeface="Arial"/>
+            </a:endParaRPr>
+          </a:p>
+          <a:p>
+            <a:pPr marL="0" marR="0" lvl="0" indent="0" algn="l" rtl="0">
+              <a:lnSpc>
+                <a:spcPct val="100000"/>
+              </a:lnSpc>
+              <a:spcBef>
+                <a:spcPts val="0"/>
+              </a:spcBef>
+              <a:spcAft>
+                <a:spcPts val="0"/>
+              </a:spcAft>
+              <a:buNone/>
+            </a:pPr>
+            <a:endParaRPr sz="1800" b="0" i="0" u="none" strike="noStrike" cap="none">
+              <a:solidFill>
+                <a:srgbClr val="000000"/>
+              </a:solidFill>
+              <a:latin typeface="Arial"/>
+              <a:ea typeface="Arial"/>
+              <a:cs typeface="Arial"/>
+              <a:sym typeface="Arial"/>
+            </a:endParaRPr>
+          </a:p>
+          <a:p>
+            <a:pPr marL="0" marR="0" lvl="0" indent="0" algn="l" rtl="0">
+              <a:lnSpc>
+                <a:spcPct val="100000"/>
+              </a:lnSpc>
+              <a:spcBef>
+                <a:spcPts val="0"/>
+              </a:spcBef>
+              <a:spcAft>
+                <a:spcPts val="0"/>
+              </a:spcAft>
+              <a:buNone/>
+            </a:pPr>
+            <a:endParaRPr sz="1800" b="0" i="0" u="none" strike="noStrike" cap="none">
+              <a:solidFill>
+                <a:srgbClr val="000000"/>
+              </a:solidFill>
+              <a:latin typeface="Arial"/>
+              <a:ea typeface="Arial"/>
+              <a:cs typeface="Arial"/>
+              <a:sym typeface="Arial"/>
+            </a:endParaRPr>
+          </a:p>
+          <a:p>
+            <a:pPr marL="0" marR="0" lvl="0" indent="0" algn="l" rtl="0">
+              <a:lnSpc>
+                <a:spcPct val="100000"/>
+              </a:lnSpc>
+              <a:spcBef>
+                <a:spcPts val="0"/>
+              </a:spcBef>
+              <a:spcAft>
+                <a:spcPts val="0"/>
+              </a:spcAft>
+              <a:buNone/>
+            </a:pPr>
+            <a:endParaRPr sz="1800" b="0" i="0" u="none" strike="noStrike" cap="none">
+              <a:solidFill>
+                <a:srgbClr val="000000"/>
+              </a:solidFill>
+              <a:latin typeface="Arial"/>
+              <a:ea typeface="Arial"/>
+              <a:cs typeface="Arial"/>
+              <a:sym typeface="Arial"/>
+            </a:endParaRPr>
+          </a:p>
+          <a:p>
+            <a:pPr marL="0" marR="0" lvl="0" indent="0" algn="l" rtl="0">
+              <a:lnSpc>
+                <a:spcPct val="100000"/>
+              </a:lnSpc>
+              <a:spcBef>
+                <a:spcPts val="0"/>
+              </a:spcBef>
+              <a:spcAft>
+                <a:spcPts val="0"/>
+              </a:spcAft>
+              <a:buNone/>
+            </a:pPr>
+            <a:endParaRPr sz="1800" b="0" i="0" u="none" strike="noStrike" cap="none">
+              <a:solidFill>
+                <a:srgbClr val="000000"/>
+              </a:solidFill>
+              <a:latin typeface="Arial"/>
+              <a:ea typeface="Arial"/>
+              <a:cs typeface="Arial"/>
+              <a:sym typeface="Arial"/>
+            </a:endParaRPr>
+          </a:p>
+        </p:txBody>
+      </p:sp>
+      <p:sp>
+        <p:nvSpPr>
+          <p:cNvPr id="138" name="Shape 138"/>
+          <p:cNvSpPr/>
+          <p:nvPr/>
+        </p:nvSpPr>
+        <p:spPr>
+          <a:xfrm>
+            <a:off x="535890" y="48960"/>
+            <a:ext cx="7766640" cy="887460"/>
+          </a:xfrm>
+          <a:prstGeom prst="rect">
+            <a:avLst/>
+          </a:prstGeom>
+          <a:noFill/>
+          <a:ln>
+            <a:noFill/>
+          </a:ln>
+        </p:spPr>
+        <p:txBody>
+          <a:bodyPr spcFirstLastPara="1" wrap="square" lIns="90000" tIns="45000" rIns="90000" bIns="45000" anchor="t" anchorCtr="0">
+            <a:noAutofit/>
+          </a:bodyPr>
+          <a:lstStyle/>
+          <a:p>
+            <a:pPr marL="0" marR="0" lvl="0" indent="0" algn="l" rtl="0">
+              <a:lnSpc>
+                <a:spcPct val="100000"/>
+              </a:lnSpc>
+              <a:spcBef>
+                <a:spcPts val="0"/>
+              </a:spcBef>
+              <a:spcAft>
+                <a:spcPts val="0"/>
+              </a:spcAft>
+              <a:buNone/>
+            </a:pPr>
+            <a:r>
+              <a:rPr lang="en-US" sz="3600" b="1" i="0" u="none" strike="noStrike" cap="none" dirty="0">
+                <a:solidFill>
+                  <a:srgbClr val="FFFFFF"/>
+                </a:solidFill>
+                <a:latin typeface="Arial"/>
+                <a:ea typeface="Arial"/>
+                <a:cs typeface="Arial"/>
+                <a:sym typeface="Arial"/>
+              </a:rPr>
+              <a:t>Architecture overview</a:t>
+            </a:r>
+          </a:p>
+          <a:p>
+            <a:r>
+              <a:rPr lang="en-IN" dirty="0">
+                <a:solidFill>
+                  <a:srgbClr val="FFFFFF"/>
+                </a:solidFill>
+              </a:rPr>
+              <a:t>Explain the Architecture you followed in your solution</a:t>
+            </a:r>
+            <a:endParaRPr lang="en-IN" dirty="0"/>
+          </a:p>
+          <a:p>
+            <a:pPr marL="0" marR="0" lvl="0" indent="0" algn="l" rtl="0">
+              <a:lnSpc>
+                <a:spcPct val="100000"/>
+              </a:lnSpc>
+              <a:spcBef>
+                <a:spcPts val="0"/>
+              </a:spcBef>
+              <a:spcAft>
+                <a:spcPts val="0"/>
+              </a:spcAft>
+              <a:buNone/>
+            </a:pPr>
+            <a:endParaRPr b="0" i="0" u="none" strike="noStrike" cap="none" dirty="0">
+              <a:solidFill>
+                <a:srgbClr val="000000"/>
+              </a:solidFill>
+              <a:sym typeface="Arial"/>
+            </a:endParaRPr>
+          </a:p>
+          <a:p>
+            <a:pPr marL="0" marR="0" lvl="0" indent="0" algn="ctr" rtl="0">
+              <a:lnSpc>
+                <a:spcPct val="42000"/>
+              </a:lnSpc>
+              <a:spcBef>
+                <a:spcPts val="0"/>
+              </a:spcBef>
+              <a:spcAft>
+                <a:spcPts val="0"/>
+              </a:spcAft>
+              <a:buNone/>
+            </a:pPr>
+            <a:endParaRPr sz="1800" b="0" i="0" u="none" strike="noStrike" cap="none" dirty="0">
+              <a:solidFill>
+                <a:srgbClr val="000000"/>
+              </a:solidFill>
+              <a:latin typeface="Arial"/>
+              <a:ea typeface="Arial"/>
+              <a:cs typeface="Arial"/>
+              <a:sym typeface="Arial"/>
+            </a:endParaRPr>
+          </a:p>
+          <a:p>
+            <a:pPr marL="0" marR="0" lvl="0" indent="0" algn="ctr" rtl="0">
+              <a:lnSpc>
+                <a:spcPct val="54000"/>
+              </a:lnSpc>
+              <a:spcBef>
+                <a:spcPts val="0"/>
+              </a:spcBef>
+              <a:spcAft>
+                <a:spcPts val="0"/>
+              </a:spcAft>
+              <a:buNone/>
+            </a:pPr>
+            <a:endParaRPr sz="1800" b="0" i="0" u="none" strike="noStrike" cap="none" dirty="0">
+              <a:solidFill>
+                <a:srgbClr val="000000"/>
+              </a:solidFill>
+              <a:latin typeface="Arial"/>
+              <a:ea typeface="Arial"/>
+              <a:cs typeface="Arial"/>
+              <a:sym typeface="Arial"/>
+            </a:endParaRPr>
+          </a:p>
+        </p:txBody>
+      </p:sp>
+      <p:pic>
+        <p:nvPicPr>
+          <p:cNvPr id="139" name="Shape 139"/>
+          <p:cNvPicPr preferRelativeResize="0"/>
+          <p:nvPr/>
+        </p:nvPicPr>
+        <p:blipFill rotWithShape="1">
+          <a:blip r:embed="rId3">
+            <a:alphaModFix/>
+          </a:blip>
+          <a:srcRect/>
+          <a:stretch/>
+        </p:blipFill>
+        <p:spPr>
+          <a:xfrm>
+            <a:off x="3888000" y="6782400"/>
+            <a:ext cx="2013480" cy="487080"/>
+          </a:xfrm>
+          <a:prstGeom prst="rect">
+            <a:avLst/>
+          </a:prstGeom>
+          <a:noFill/>
+          <a:ln>
+            <a:noFill/>
+          </a:ln>
+        </p:spPr>
+      </p:pic>
+      <p:sp>
+        <p:nvSpPr>
+          <p:cNvPr id="5" name="TextBox 4"/>
+          <p:cNvSpPr txBox="1"/>
+          <p:nvPr/>
+        </p:nvSpPr>
+        <p:spPr>
+          <a:xfrm>
+            <a:off x="800100" y="455850"/>
+            <a:ext cx="8699500" cy="3323987"/>
+          </a:xfrm>
+          <a:prstGeom prst="rect">
+            <a:avLst/>
+          </a:prstGeom>
+          <a:noFill/>
+        </p:spPr>
+        <p:txBody>
+          <a:bodyPr wrap="square" rtlCol="0">
+            <a:spAutoFit/>
+          </a:bodyPr>
+          <a:lstStyle/>
+          <a:p>
+            <a:endParaRPr lang="en-US" dirty="0">
+              <a:solidFill>
+                <a:schemeClr val="bg1"/>
+              </a:solidFill>
+            </a:endParaRPr>
+          </a:p>
+          <a:p>
+            <a:endParaRPr lang="en-US" dirty="0">
+              <a:solidFill>
+                <a:schemeClr val="bg1"/>
+              </a:solidFill>
+            </a:endParaRPr>
+          </a:p>
+          <a:p>
+            <a:endParaRPr lang="en-US" dirty="0">
+              <a:solidFill>
+                <a:schemeClr val="bg1"/>
+              </a:solidFill>
+            </a:endParaRPr>
+          </a:p>
+          <a:p>
+            <a:endParaRPr lang="en-US" dirty="0">
+              <a:solidFill>
+                <a:schemeClr val="bg1"/>
+              </a:solidFill>
+            </a:endParaRPr>
+          </a:p>
+          <a:p>
+            <a:endParaRPr lang="en-US" dirty="0">
+              <a:solidFill>
+                <a:schemeClr val="bg1"/>
+              </a:solidFill>
+            </a:endParaRPr>
+          </a:p>
+          <a:p>
+            <a:endParaRPr lang="en-US" dirty="0">
+              <a:solidFill>
+                <a:schemeClr val="bg1"/>
+              </a:solidFill>
+            </a:endParaRPr>
+          </a:p>
+          <a:p>
+            <a:endParaRPr lang="en-US" dirty="0">
+              <a:solidFill>
+                <a:schemeClr val="bg1"/>
+              </a:solidFill>
+            </a:endParaRPr>
+          </a:p>
+          <a:p>
+            <a:endParaRPr lang="en-US" dirty="0">
+              <a:solidFill>
+                <a:schemeClr val="bg1"/>
+              </a:solidFill>
+            </a:endParaRPr>
+          </a:p>
+          <a:p>
+            <a:endParaRPr lang="en-US" dirty="0">
+              <a:solidFill>
+                <a:schemeClr val="bg1"/>
+              </a:solidFill>
+            </a:endParaRPr>
+          </a:p>
+          <a:p>
+            <a:endParaRPr lang="en-US" dirty="0">
+              <a:solidFill>
+                <a:schemeClr val="bg1"/>
+              </a:solidFill>
+            </a:endParaRPr>
+          </a:p>
+          <a:p>
+            <a:endParaRPr lang="en-US" dirty="0">
+              <a:solidFill>
+                <a:schemeClr val="bg1"/>
+              </a:solidFill>
+            </a:endParaRPr>
+          </a:p>
+          <a:p>
+            <a:endParaRPr lang="en-US" dirty="0">
+              <a:solidFill>
+                <a:schemeClr val="bg1"/>
+              </a:solidFill>
+            </a:endParaRPr>
+          </a:p>
+          <a:p>
+            <a:endParaRPr lang="en-US" dirty="0">
+              <a:solidFill>
+                <a:schemeClr val="bg1"/>
+              </a:solidFill>
+            </a:endParaRPr>
+          </a:p>
+          <a:p>
+            <a:endParaRPr lang="en-US" dirty="0">
+              <a:solidFill>
+                <a:schemeClr val="bg1"/>
+              </a:solidFill>
+            </a:endParaRPr>
+          </a:p>
+          <a:p>
+            <a:pPr algn="ctr"/>
+            <a:endParaRPr lang="en-US" dirty="0">
+              <a:solidFill>
+                <a:schemeClr val="bg1"/>
+              </a:solidFill>
+            </a:endParaRPr>
+          </a:p>
+        </p:txBody>
+      </p:sp>
+      <p:sp>
+        <p:nvSpPr>
+          <p:cNvPr id="2" name="Rectangle 1">
+            <a:extLst>
+              <a:ext uri="{FF2B5EF4-FFF2-40B4-BE49-F238E27FC236}">
+                <a16:creationId xmlns:a16="http://schemas.microsoft.com/office/drawing/2014/main" id="{EF6CAA3E-CD59-473A-946E-8AFE36B40C23}"/>
+              </a:ext>
+            </a:extLst>
+          </p:cNvPr>
+          <p:cNvSpPr/>
+          <p:nvPr/>
+        </p:nvSpPr>
+        <p:spPr>
+          <a:xfrm>
+            <a:off x="596630" y="1147087"/>
+            <a:ext cx="1782305" cy="2848193"/>
+          </a:xfrm>
+          <a:prstGeom prst="rect">
+            <a:avLst/>
+          </a:prstGeom>
+        </p:spPr>
+        <p:style>
+          <a:lnRef idx="2">
+            <a:schemeClr val="accent1">
+              <a:shade val="50000"/>
+            </a:schemeClr>
+          </a:lnRef>
+          <a:fillRef idx="1">
+            <a:schemeClr val="accent1"/>
+          </a:fillRef>
+          <a:effectRef idx="0">
+            <a:schemeClr val="accent1"/>
+          </a:effectRef>
+          <a:fontRef idx="minor">
+            <a:schemeClr val="lt1"/>
+          </a:fontRef>
+        </p:style>
+        <p:txBody>
+          <a:bodyPr rtlCol="0" anchor="ctr"/>
+          <a:lstStyle/>
+          <a:p>
+            <a:pPr algn="ctr"/>
+            <a:endParaRPr lang="en-US"/>
+          </a:p>
+        </p:txBody>
+      </p:sp>
+      <p:sp>
+        <p:nvSpPr>
+          <p:cNvPr id="3" name="TextBox 2">
+            <a:extLst>
+              <a:ext uri="{FF2B5EF4-FFF2-40B4-BE49-F238E27FC236}">
+                <a16:creationId xmlns:a16="http://schemas.microsoft.com/office/drawing/2014/main" id="{05090DDE-42B1-405E-BEE5-CCE4A74BEA9A}"/>
+              </a:ext>
+            </a:extLst>
+          </p:cNvPr>
+          <p:cNvSpPr txBox="1"/>
+          <p:nvPr/>
+        </p:nvSpPr>
+        <p:spPr>
+          <a:xfrm>
+            <a:off x="596630" y="1197960"/>
+            <a:ext cx="991891" cy="307777"/>
+          </a:xfrm>
+          <a:prstGeom prst="rect">
+            <a:avLst/>
+          </a:prstGeom>
+          <a:noFill/>
+        </p:spPr>
+        <p:txBody>
+          <a:bodyPr wrap="square" rtlCol="0">
+            <a:spAutoFit/>
+          </a:bodyPr>
+          <a:lstStyle/>
+          <a:p>
+            <a:r>
+              <a:rPr lang="en-US" b="1" dirty="0"/>
+              <a:t>NLP.R</a:t>
+            </a:r>
+          </a:p>
+        </p:txBody>
+      </p:sp>
+      <p:sp>
+        <p:nvSpPr>
+          <p:cNvPr id="4" name="TextBox 3">
+            <a:extLst>
+              <a:ext uri="{FF2B5EF4-FFF2-40B4-BE49-F238E27FC236}">
+                <a16:creationId xmlns:a16="http://schemas.microsoft.com/office/drawing/2014/main" id="{0E5123B2-BFB5-4819-B41C-7ADBB3C626E3}"/>
+              </a:ext>
+            </a:extLst>
+          </p:cNvPr>
+          <p:cNvSpPr txBox="1"/>
+          <p:nvPr/>
+        </p:nvSpPr>
+        <p:spPr>
+          <a:xfrm>
+            <a:off x="596630" y="1625329"/>
+            <a:ext cx="1782305" cy="2462213"/>
+          </a:xfrm>
+          <a:prstGeom prst="rect">
+            <a:avLst/>
+          </a:prstGeom>
+          <a:noFill/>
+        </p:spPr>
+        <p:txBody>
+          <a:bodyPr wrap="square" rtlCol="0">
+            <a:spAutoFit/>
+          </a:bodyPr>
+          <a:lstStyle/>
+          <a:p>
+            <a:r>
+              <a:rPr lang="en-US" dirty="0"/>
+              <a:t>NLP based Model training.</a:t>
+            </a:r>
+          </a:p>
+          <a:p>
+            <a:endParaRPr lang="en-US" dirty="0"/>
+          </a:p>
+          <a:p>
+            <a:r>
+              <a:rPr lang="en-US" dirty="0"/>
+              <a:t>Recommendation engine.</a:t>
+            </a:r>
+          </a:p>
+          <a:p>
+            <a:endParaRPr lang="en-US" dirty="0"/>
+          </a:p>
+          <a:p>
+            <a:r>
+              <a:rPr lang="en-US" dirty="0"/>
+              <a:t>Reinforcement Learning function</a:t>
+            </a:r>
+          </a:p>
+          <a:p>
+            <a:endParaRPr lang="en-US" dirty="0"/>
+          </a:p>
+          <a:p>
+            <a:r>
+              <a:rPr lang="en-US" dirty="0"/>
+              <a:t>POS tagging function</a:t>
+            </a:r>
+          </a:p>
+        </p:txBody>
+      </p:sp>
+      <p:sp>
+        <p:nvSpPr>
+          <p:cNvPr id="6" name="Rectangle: Rounded Corners 5">
+            <a:extLst>
+              <a:ext uri="{FF2B5EF4-FFF2-40B4-BE49-F238E27FC236}">
+                <a16:creationId xmlns:a16="http://schemas.microsoft.com/office/drawing/2014/main" id="{3AD2D508-EACA-4FBE-838E-38641ED234B1}"/>
+              </a:ext>
+            </a:extLst>
+          </p:cNvPr>
+          <p:cNvSpPr/>
+          <p:nvPr/>
+        </p:nvSpPr>
+        <p:spPr>
+          <a:xfrm>
+            <a:off x="3363132" y="1197960"/>
+            <a:ext cx="3053166" cy="2797320"/>
+          </a:xfrm>
+          <a:prstGeom prst="roundRect">
+            <a:avLst/>
+          </a:prstGeom>
+        </p:spPr>
+        <p:style>
+          <a:lnRef idx="2">
+            <a:schemeClr val="accent1">
+              <a:shade val="50000"/>
+            </a:schemeClr>
+          </a:lnRef>
+          <a:fillRef idx="1">
+            <a:schemeClr val="accent1"/>
+          </a:fillRef>
+          <a:effectRef idx="0">
+            <a:schemeClr val="accent1"/>
+          </a:effectRef>
+          <a:fontRef idx="minor">
+            <a:schemeClr val="lt1"/>
+          </a:fontRef>
+        </p:style>
+        <p:txBody>
+          <a:bodyPr rtlCol="0" anchor="ctr"/>
+          <a:lstStyle/>
+          <a:p>
+            <a:pPr algn="ctr"/>
+            <a:endParaRPr lang="en-US"/>
+          </a:p>
+        </p:txBody>
+      </p:sp>
+      <p:sp>
+        <p:nvSpPr>
+          <p:cNvPr id="7" name="TextBox 6">
+            <a:extLst>
+              <a:ext uri="{FF2B5EF4-FFF2-40B4-BE49-F238E27FC236}">
+                <a16:creationId xmlns:a16="http://schemas.microsoft.com/office/drawing/2014/main" id="{301800E2-1CE4-4043-937E-51D778618EC4}"/>
+              </a:ext>
+            </a:extLst>
+          </p:cNvPr>
+          <p:cNvSpPr txBox="1"/>
+          <p:nvPr/>
+        </p:nvSpPr>
+        <p:spPr>
+          <a:xfrm>
+            <a:off x="3445010" y="1273917"/>
+            <a:ext cx="1948400" cy="307777"/>
+          </a:xfrm>
+          <a:prstGeom prst="rect">
+            <a:avLst/>
+          </a:prstGeom>
+          <a:noFill/>
+        </p:spPr>
+        <p:txBody>
+          <a:bodyPr wrap="square" rtlCol="0">
+            <a:spAutoFit/>
+          </a:bodyPr>
+          <a:lstStyle/>
+          <a:p>
+            <a:r>
+              <a:rPr lang="en-US" b="1" dirty="0" err="1"/>
+              <a:t>Analyse_input.R</a:t>
+            </a:r>
+            <a:endParaRPr lang="en-US" b="1" dirty="0"/>
+          </a:p>
+        </p:txBody>
+      </p:sp>
+      <p:sp>
+        <p:nvSpPr>
+          <p:cNvPr id="8" name="TextBox 7">
+            <a:extLst>
+              <a:ext uri="{FF2B5EF4-FFF2-40B4-BE49-F238E27FC236}">
+                <a16:creationId xmlns:a16="http://schemas.microsoft.com/office/drawing/2014/main" id="{379C7D20-7AF0-4619-8074-2531E106F0F0}"/>
+              </a:ext>
+            </a:extLst>
+          </p:cNvPr>
+          <p:cNvSpPr txBox="1"/>
+          <p:nvPr/>
+        </p:nvSpPr>
+        <p:spPr>
+          <a:xfrm>
+            <a:off x="3445010" y="1625329"/>
+            <a:ext cx="2847302" cy="2031325"/>
+          </a:xfrm>
+          <a:prstGeom prst="rect">
+            <a:avLst/>
+          </a:prstGeom>
+          <a:noFill/>
+        </p:spPr>
+        <p:txBody>
+          <a:bodyPr wrap="square" rtlCol="0">
+            <a:spAutoFit/>
+          </a:bodyPr>
+          <a:lstStyle/>
+          <a:p>
+            <a:r>
+              <a:rPr lang="en-US" dirty="0"/>
+              <a:t>Maintains the interactive chat.</a:t>
+            </a:r>
+          </a:p>
+          <a:p>
+            <a:endParaRPr lang="en-US" dirty="0"/>
+          </a:p>
+          <a:p>
+            <a:r>
+              <a:rPr lang="en-US" dirty="0"/>
+              <a:t>Invokes the Recommendation engines for getting solutions.</a:t>
+            </a:r>
+          </a:p>
+          <a:p>
+            <a:endParaRPr lang="en-US" dirty="0"/>
+          </a:p>
+          <a:p>
+            <a:r>
+              <a:rPr lang="en-US" dirty="0"/>
+              <a:t>Raises the L1 ticket if no solution is found  </a:t>
+            </a:r>
+          </a:p>
+          <a:p>
+            <a:endParaRPr lang="en-US" dirty="0"/>
+          </a:p>
+          <a:p>
+            <a:endParaRPr lang="en-US" dirty="0"/>
+          </a:p>
+        </p:txBody>
+      </p:sp>
+      <p:sp>
+        <p:nvSpPr>
+          <p:cNvPr id="12" name="Rectangle 11">
+            <a:extLst>
+              <a:ext uri="{FF2B5EF4-FFF2-40B4-BE49-F238E27FC236}">
+                <a16:creationId xmlns:a16="http://schemas.microsoft.com/office/drawing/2014/main" id="{B7D61CF6-8F99-4C81-912A-DE95CDA618EA}"/>
+              </a:ext>
+            </a:extLst>
+          </p:cNvPr>
+          <p:cNvSpPr/>
+          <p:nvPr/>
+        </p:nvSpPr>
+        <p:spPr>
+          <a:xfrm>
+            <a:off x="7629416" y="1147086"/>
+            <a:ext cx="1782305" cy="2848193"/>
+          </a:xfrm>
+          <a:prstGeom prst="rect">
+            <a:avLst/>
+          </a:prstGeom>
+        </p:spPr>
+        <p:style>
+          <a:lnRef idx="2">
+            <a:schemeClr val="accent1">
+              <a:shade val="50000"/>
+            </a:schemeClr>
+          </a:lnRef>
+          <a:fillRef idx="1">
+            <a:schemeClr val="accent1"/>
+          </a:fillRef>
+          <a:effectRef idx="0">
+            <a:schemeClr val="accent1"/>
+          </a:effectRef>
+          <a:fontRef idx="minor">
+            <a:schemeClr val="lt1"/>
+          </a:fontRef>
+        </p:style>
+        <p:txBody>
+          <a:bodyPr rtlCol="0" anchor="ctr"/>
+          <a:lstStyle/>
+          <a:p>
+            <a:pPr algn="ctr"/>
+            <a:endParaRPr lang="en-US"/>
+          </a:p>
+        </p:txBody>
+      </p:sp>
+      <p:sp>
+        <p:nvSpPr>
+          <p:cNvPr id="9" name="TextBox 8">
+            <a:extLst>
+              <a:ext uri="{FF2B5EF4-FFF2-40B4-BE49-F238E27FC236}">
+                <a16:creationId xmlns:a16="http://schemas.microsoft.com/office/drawing/2014/main" id="{BE08C376-38C0-4E95-87B1-69B894922A3B}"/>
+              </a:ext>
+            </a:extLst>
+          </p:cNvPr>
+          <p:cNvSpPr txBox="1"/>
+          <p:nvPr/>
+        </p:nvSpPr>
+        <p:spPr>
+          <a:xfrm>
+            <a:off x="7749153" y="1273917"/>
+            <a:ext cx="1531372" cy="2031325"/>
+          </a:xfrm>
+          <a:prstGeom prst="rect">
+            <a:avLst/>
+          </a:prstGeom>
+          <a:noFill/>
+        </p:spPr>
+        <p:txBody>
+          <a:bodyPr wrap="square" rtlCol="0">
+            <a:spAutoFit/>
+          </a:bodyPr>
+          <a:lstStyle/>
+          <a:p>
+            <a:r>
+              <a:rPr lang="en-US" b="1" dirty="0" err="1"/>
+              <a:t>App.R</a:t>
+            </a:r>
+            <a:endParaRPr lang="en-US" b="1" dirty="0"/>
+          </a:p>
+          <a:p>
+            <a:endParaRPr lang="en-US" b="1" dirty="0"/>
+          </a:p>
+          <a:p>
+            <a:r>
+              <a:rPr lang="en-US" dirty="0"/>
+              <a:t>UI to initiate the chatbot</a:t>
+            </a:r>
+          </a:p>
+          <a:p>
+            <a:endParaRPr lang="en-US" dirty="0"/>
+          </a:p>
+          <a:p>
+            <a:r>
+              <a:rPr lang="en-US" dirty="0"/>
+              <a:t>Problem Input </a:t>
+            </a:r>
+          </a:p>
+          <a:p>
+            <a:r>
+              <a:rPr lang="en-US" dirty="0"/>
+              <a:t>Solution Output</a:t>
+            </a:r>
+          </a:p>
+          <a:p>
+            <a:endParaRPr lang="en-US" dirty="0"/>
+          </a:p>
+          <a:p>
+            <a:endParaRPr lang="en-US" dirty="0"/>
+          </a:p>
+        </p:txBody>
+      </p:sp>
+      <p:sp>
+        <p:nvSpPr>
+          <p:cNvPr id="10" name="Arrow: Right 9">
+            <a:extLst>
+              <a:ext uri="{FF2B5EF4-FFF2-40B4-BE49-F238E27FC236}">
+                <a16:creationId xmlns:a16="http://schemas.microsoft.com/office/drawing/2014/main" id="{214D275D-ADA5-4FEE-9871-7D000D975090}"/>
+              </a:ext>
+            </a:extLst>
+          </p:cNvPr>
+          <p:cNvSpPr/>
+          <p:nvPr/>
+        </p:nvSpPr>
+        <p:spPr>
+          <a:xfrm>
+            <a:off x="6588772" y="2603927"/>
+            <a:ext cx="952765" cy="480448"/>
+          </a:xfrm>
+          <a:prstGeom prst="rightArrow">
+            <a:avLst/>
+          </a:prstGeom>
+        </p:spPr>
+        <p:style>
+          <a:lnRef idx="2">
+            <a:schemeClr val="accent1">
+              <a:shade val="50000"/>
+            </a:schemeClr>
+          </a:lnRef>
+          <a:fillRef idx="1">
+            <a:schemeClr val="accent1"/>
+          </a:fillRef>
+          <a:effectRef idx="0">
+            <a:schemeClr val="accent1"/>
+          </a:effectRef>
+          <a:fontRef idx="minor">
+            <a:schemeClr val="lt1"/>
+          </a:fontRef>
+        </p:style>
+        <p:txBody>
+          <a:bodyPr rtlCol="0" anchor="ctr"/>
+          <a:lstStyle/>
+          <a:p>
+            <a:pPr algn="ctr"/>
+            <a:endParaRPr lang="en-US"/>
+          </a:p>
+        </p:txBody>
+      </p:sp>
+      <p:sp>
+        <p:nvSpPr>
+          <p:cNvPr id="15" name="Arrow: Right 14">
+            <a:extLst>
+              <a:ext uri="{FF2B5EF4-FFF2-40B4-BE49-F238E27FC236}">
+                <a16:creationId xmlns:a16="http://schemas.microsoft.com/office/drawing/2014/main" id="{7B393A6E-F8D5-45A2-ABAF-89FFE8FA0C44}"/>
+              </a:ext>
+            </a:extLst>
+          </p:cNvPr>
+          <p:cNvSpPr/>
+          <p:nvPr/>
+        </p:nvSpPr>
+        <p:spPr>
+          <a:xfrm>
+            <a:off x="2394651" y="2640991"/>
+            <a:ext cx="952765" cy="480448"/>
+          </a:xfrm>
+          <a:prstGeom prst="rightArrow">
+            <a:avLst/>
+          </a:prstGeom>
+        </p:spPr>
+        <p:style>
+          <a:lnRef idx="2">
+            <a:schemeClr val="accent1">
+              <a:shade val="50000"/>
+            </a:schemeClr>
+          </a:lnRef>
+          <a:fillRef idx="1">
+            <a:schemeClr val="accent1"/>
+          </a:fillRef>
+          <a:effectRef idx="0">
+            <a:schemeClr val="accent1"/>
+          </a:effectRef>
+          <a:fontRef idx="minor">
+            <a:schemeClr val="lt1"/>
+          </a:fontRef>
+        </p:style>
+        <p:txBody>
+          <a:bodyPr rtlCol="0" anchor="ctr"/>
+          <a:lstStyle/>
+          <a:p>
+            <a:pPr algn="ctr"/>
+            <a:endParaRPr lang="en-US"/>
+          </a:p>
+        </p:txBody>
+      </p:sp>
+      <p:sp>
+        <p:nvSpPr>
+          <p:cNvPr id="16" name="Arrow: Right 15">
+            <a:extLst>
+              <a:ext uri="{FF2B5EF4-FFF2-40B4-BE49-F238E27FC236}">
+                <a16:creationId xmlns:a16="http://schemas.microsoft.com/office/drawing/2014/main" id="{405E4D5E-DC71-4931-890C-D7DF8FA4A3C1}"/>
+              </a:ext>
+            </a:extLst>
+          </p:cNvPr>
+          <p:cNvSpPr/>
+          <p:nvPr/>
+        </p:nvSpPr>
+        <p:spPr>
+          <a:xfrm rot="10800000">
+            <a:off x="2378935" y="1909019"/>
+            <a:ext cx="952765" cy="480448"/>
+          </a:xfrm>
+          <a:prstGeom prst="rightArrow">
+            <a:avLst/>
+          </a:prstGeom>
+        </p:spPr>
+        <p:style>
+          <a:lnRef idx="2">
+            <a:schemeClr val="accent1">
+              <a:shade val="50000"/>
+            </a:schemeClr>
+          </a:lnRef>
+          <a:fillRef idx="1">
+            <a:schemeClr val="accent1"/>
+          </a:fillRef>
+          <a:effectRef idx="0">
+            <a:schemeClr val="accent1"/>
+          </a:effectRef>
+          <a:fontRef idx="minor">
+            <a:schemeClr val="lt1"/>
+          </a:fontRef>
+        </p:style>
+        <p:txBody>
+          <a:bodyPr rtlCol="0" anchor="ctr"/>
+          <a:lstStyle/>
+          <a:p>
+            <a:pPr algn="ctr"/>
+            <a:endParaRPr lang="en-US"/>
+          </a:p>
+        </p:txBody>
+      </p:sp>
+      <p:sp>
+        <p:nvSpPr>
+          <p:cNvPr id="17" name="Arrow: Right 16">
+            <a:extLst>
+              <a:ext uri="{FF2B5EF4-FFF2-40B4-BE49-F238E27FC236}">
+                <a16:creationId xmlns:a16="http://schemas.microsoft.com/office/drawing/2014/main" id="{2494F4CF-0321-4DF2-A6A2-F6DABDA3EFBE}"/>
+              </a:ext>
+            </a:extLst>
+          </p:cNvPr>
+          <p:cNvSpPr/>
+          <p:nvPr/>
+        </p:nvSpPr>
+        <p:spPr>
+          <a:xfrm rot="10800000">
+            <a:off x="6465378" y="1909019"/>
+            <a:ext cx="952765" cy="480448"/>
+          </a:xfrm>
+          <a:prstGeom prst="rightArrow">
+            <a:avLst/>
+          </a:prstGeom>
+        </p:spPr>
+        <p:style>
+          <a:lnRef idx="2">
+            <a:schemeClr val="accent1">
+              <a:shade val="50000"/>
+            </a:schemeClr>
+          </a:lnRef>
+          <a:fillRef idx="1">
+            <a:schemeClr val="accent1"/>
+          </a:fillRef>
+          <a:effectRef idx="0">
+            <a:schemeClr val="accent1"/>
+          </a:effectRef>
+          <a:fontRef idx="minor">
+            <a:schemeClr val="lt1"/>
+          </a:fontRef>
+        </p:style>
+        <p:txBody>
+          <a:bodyPr rtlCol="0" anchor="ctr"/>
+          <a:lstStyle/>
+          <a:p>
+            <a:pPr algn="ctr"/>
+            <a:endParaRPr lang="en-US"/>
+          </a:p>
+        </p:txBody>
+      </p:sp>
+      <p:sp>
+        <p:nvSpPr>
+          <p:cNvPr id="18" name="Rectangle 17">
+            <a:extLst>
+              <a:ext uri="{FF2B5EF4-FFF2-40B4-BE49-F238E27FC236}">
+                <a16:creationId xmlns:a16="http://schemas.microsoft.com/office/drawing/2014/main" id="{8C041B8A-8C54-45E5-BCE0-3DE73CF1219C}"/>
+              </a:ext>
+            </a:extLst>
+          </p:cNvPr>
+          <p:cNvSpPr/>
+          <p:nvPr/>
+        </p:nvSpPr>
+        <p:spPr>
+          <a:xfrm>
+            <a:off x="1099326" y="4421287"/>
+            <a:ext cx="1782305" cy="2848193"/>
+          </a:xfrm>
+          <a:prstGeom prst="rect">
+            <a:avLst/>
+          </a:prstGeom>
+        </p:spPr>
+        <p:style>
+          <a:lnRef idx="2">
+            <a:schemeClr val="accent1">
+              <a:shade val="50000"/>
+            </a:schemeClr>
+          </a:lnRef>
+          <a:fillRef idx="1">
+            <a:schemeClr val="accent1"/>
+          </a:fillRef>
+          <a:effectRef idx="0">
+            <a:schemeClr val="accent1"/>
+          </a:effectRef>
+          <a:fontRef idx="minor">
+            <a:schemeClr val="lt1"/>
+          </a:fontRef>
+        </p:style>
+        <p:txBody>
+          <a:bodyPr rtlCol="0" anchor="ctr"/>
+          <a:lstStyle/>
+          <a:p>
+            <a:pPr algn="ctr"/>
+            <a:endParaRPr lang="en-US" dirty="0"/>
+          </a:p>
+        </p:txBody>
+      </p:sp>
+      <p:sp>
+        <p:nvSpPr>
+          <p:cNvPr id="11" name="TextBox 10">
+            <a:extLst>
+              <a:ext uri="{FF2B5EF4-FFF2-40B4-BE49-F238E27FC236}">
+                <a16:creationId xmlns:a16="http://schemas.microsoft.com/office/drawing/2014/main" id="{623C0499-C74B-43B7-B185-72CB2C3EE5D3}"/>
+              </a:ext>
+            </a:extLst>
+          </p:cNvPr>
+          <p:cNvSpPr txBox="1"/>
+          <p:nvPr/>
+        </p:nvSpPr>
+        <p:spPr>
+          <a:xfrm>
+            <a:off x="1213145" y="4565784"/>
+            <a:ext cx="1514557" cy="2031325"/>
+          </a:xfrm>
+          <a:prstGeom prst="rect">
+            <a:avLst/>
+          </a:prstGeom>
+          <a:noFill/>
+        </p:spPr>
+        <p:txBody>
+          <a:bodyPr wrap="square" rtlCol="0">
+            <a:spAutoFit/>
+          </a:bodyPr>
+          <a:lstStyle/>
+          <a:p>
+            <a:r>
+              <a:rPr lang="en-US" b="1" dirty="0"/>
+              <a:t>L1_support.R</a:t>
+            </a:r>
+          </a:p>
+          <a:p>
+            <a:endParaRPr lang="en-US" b="1" dirty="0"/>
+          </a:p>
+          <a:p>
+            <a:r>
+              <a:rPr lang="en-US" dirty="0"/>
+              <a:t>UI based input/output program to tag the un resolved issues when it is resolved by L1 agents.</a:t>
+            </a:r>
+          </a:p>
+        </p:txBody>
+      </p:sp>
+      <p:sp>
+        <p:nvSpPr>
+          <p:cNvPr id="20" name="Rectangle 19">
+            <a:extLst>
+              <a:ext uri="{FF2B5EF4-FFF2-40B4-BE49-F238E27FC236}">
+                <a16:creationId xmlns:a16="http://schemas.microsoft.com/office/drawing/2014/main" id="{B772A923-1346-42A3-995A-7F44065E30DC}"/>
+              </a:ext>
+            </a:extLst>
+          </p:cNvPr>
+          <p:cNvSpPr/>
+          <p:nvPr/>
+        </p:nvSpPr>
+        <p:spPr>
+          <a:xfrm>
+            <a:off x="6292312" y="4421286"/>
+            <a:ext cx="1782305" cy="2848193"/>
+          </a:xfrm>
+          <a:prstGeom prst="rect">
+            <a:avLst/>
+          </a:prstGeom>
+        </p:spPr>
+        <p:style>
+          <a:lnRef idx="2">
+            <a:schemeClr val="accent1">
+              <a:shade val="50000"/>
+            </a:schemeClr>
+          </a:lnRef>
+          <a:fillRef idx="1">
+            <a:schemeClr val="accent1"/>
+          </a:fillRef>
+          <a:effectRef idx="0">
+            <a:schemeClr val="accent1"/>
+          </a:effectRef>
+          <a:fontRef idx="minor">
+            <a:schemeClr val="lt1"/>
+          </a:fontRef>
+        </p:style>
+        <p:txBody>
+          <a:bodyPr rtlCol="0" anchor="ctr"/>
+          <a:lstStyle/>
+          <a:p>
+            <a:pPr algn="ctr"/>
+            <a:endParaRPr lang="en-US" dirty="0"/>
+          </a:p>
+        </p:txBody>
+      </p:sp>
+      <p:sp>
+        <p:nvSpPr>
+          <p:cNvPr id="13" name="TextBox 12">
+            <a:extLst>
+              <a:ext uri="{FF2B5EF4-FFF2-40B4-BE49-F238E27FC236}">
+                <a16:creationId xmlns:a16="http://schemas.microsoft.com/office/drawing/2014/main" id="{C675E667-3F38-43B1-A33E-1B2CB9D8BE67}"/>
+              </a:ext>
+            </a:extLst>
+          </p:cNvPr>
+          <p:cNvSpPr txBox="1"/>
+          <p:nvPr/>
+        </p:nvSpPr>
+        <p:spPr>
+          <a:xfrm>
+            <a:off x="6416298" y="4629253"/>
+            <a:ext cx="1549831" cy="2246769"/>
+          </a:xfrm>
+          <a:prstGeom prst="rect">
+            <a:avLst/>
+          </a:prstGeom>
+          <a:noFill/>
+        </p:spPr>
+        <p:txBody>
+          <a:bodyPr wrap="square" rtlCol="0">
+            <a:spAutoFit/>
+          </a:bodyPr>
+          <a:lstStyle/>
+          <a:p>
+            <a:r>
+              <a:rPr lang="en-US" b="1" dirty="0" err="1"/>
+              <a:t>Main_UI.R</a:t>
+            </a:r>
+            <a:endParaRPr lang="en-US" b="1" dirty="0"/>
+          </a:p>
+          <a:p>
+            <a:endParaRPr lang="en-US" b="1" dirty="0"/>
+          </a:p>
+          <a:p>
+            <a:r>
+              <a:rPr lang="en-US" dirty="0"/>
+              <a:t>UI based program to invoke training,</a:t>
+            </a:r>
+          </a:p>
+          <a:p>
+            <a:r>
+              <a:rPr lang="en-US" dirty="0"/>
+              <a:t>Re training,</a:t>
+            </a:r>
+          </a:p>
+          <a:p>
+            <a:r>
+              <a:rPr lang="en-US" dirty="0"/>
+              <a:t>Reinforcement learning when required to avoid manual run</a:t>
+            </a:r>
           </a:p>
         </p:txBody>
       </p:sp>
@@ -18552,7 +20623,7 @@
 </p:sld>
 </file>
 
-<file path=ppt/slides/slide7.xml><?xml version="1.0" encoding="utf-8"?>
+<file path=ppt/slides/slide8.xml><?xml version="1.0" encoding="utf-8"?>
 <p:sld xmlns:a="http://schemas.openxmlformats.org/drawingml/2006/main" xmlns:r="http://schemas.openxmlformats.org/officeDocument/2006/relationships" xmlns:p="http://schemas.openxmlformats.org/presentationml/2006/main">
   <p:cSld>
     <p:spTree>
@@ -18577,8 +20648,8 @@
         </p:nvSpPr>
         <p:spPr>
           <a:xfrm>
-            <a:off x="503640" y="791640"/>
-            <a:ext cx="9138240" cy="4962600"/>
+            <a:off x="503640" y="791639"/>
+            <a:ext cx="9138240" cy="5976395"/>
           </a:xfrm>
           <a:prstGeom prst="rect">
             <a:avLst/>
@@ -18793,7 +20864,7 @@
         <p:spPr>
           <a:xfrm>
             <a:off x="723010" y="1921555"/>
-            <a:ext cx="8699500" cy="3539430"/>
+            <a:ext cx="8699500" cy="7848302"/>
           </a:xfrm>
           <a:prstGeom prst="rect">
             <a:avLst/>
@@ -18806,14 +20877,130 @@
           </a:bodyPr>
           <a:lstStyle/>
           <a:p>
-            <a:pPr algn="ctr"/>
             <a:r>
               <a:rPr lang="en-US" dirty="0">
                 <a:solidFill>
                   <a:schemeClr val="bg1"/>
                 </a:solidFill>
               </a:rPr>
-              <a:t>Add Text here</a:t>
+              <a:t>The application works on the principle of entity –intent keyword pair.</a:t>
+            </a:r>
+          </a:p>
+          <a:p>
+            <a:r>
+              <a:rPr lang="en-US" dirty="0">
+                <a:solidFill>
+                  <a:schemeClr val="bg1"/>
+                </a:solidFill>
+              </a:rPr>
+              <a:t>The FAQ document is been utilized to create a set of questions and solutions</a:t>
+            </a:r>
+          </a:p>
+          <a:p>
+            <a:r>
+              <a:rPr lang="en-US" dirty="0">
+                <a:solidFill>
+                  <a:schemeClr val="bg1"/>
+                </a:solidFill>
+              </a:rPr>
+              <a:t>List of popular entities or the key words that are the subject of the issues is prepared</a:t>
+            </a:r>
+          </a:p>
+          <a:p>
+            <a:r>
+              <a:rPr lang="en-US" dirty="0">
+                <a:solidFill>
+                  <a:schemeClr val="bg1"/>
+                </a:solidFill>
+              </a:rPr>
+              <a:t>List of popular intent or the key words that are the supporting verb to the subject of the issues is prepared</a:t>
+            </a:r>
+          </a:p>
+          <a:p>
+            <a:r>
+              <a:rPr lang="en-US" dirty="0">
+                <a:solidFill>
+                  <a:schemeClr val="bg1"/>
+                </a:solidFill>
+              </a:rPr>
+              <a:t>A bag of word model is created out of the FAQ problems to tag the entities of the Question with the entity list.</a:t>
+            </a:r>
+          </a:p>
+          <a:p>
+            <a:r>
+              <a:rPr lang="en-US" dirty="0">
+                <a:solidFill>
+                  <a:schemeClr val="bg1"/>
+                </a:solidFill>
+              </a:rPr>
+              <a:t>This way we are multiclass labelling the questions.</a:t>
+            </a:r>
+          </a:p>
+          <a:p>
+            <a:endParaRPr lang="en-US" dirty="0">
+              <a:solidFill>
+                <a:schemeClr val="bg1"/>
+              </a:solidFill>
+            </a:endParaRPr>
+          </a:p>
+          <a:p>
+            <a:r>
+              <a:rPr lang="en-US" dirty="0">
+                <a:solidFill>
+                  <a:schemeClr val="bg1"/>
+                </a:solidFill>
+              </a:rPr>
+              <a:t>Whenever a new question arrives, we apply the same bag of word model and attempts to find the number of matching entities with out existing list.</a:t>
+            </a:r>
+          </a:p>
+          <a:p>
+            <a:r>
+              <a:rPr lang="en-US" dirty="0">
+                <a:solidFill>
+                  <a:schemeClr val="bg1"/>
+                </a:solidFill>
+              </a:rPr>
+              <a:t>We do the same with the intent.</a:t>
+            </a:r>
+          </a:p>
+          <a:p>
+            <a:r>
+              <a:rPr lang="en-US" dirty="0">
+                <a:solidFill>
+                  <a:schemeClr val="bg1"/>
+                </a:solidFill>
+              </a:rPr>
+              <a:t>Based on the entities we pick the best labeled question that closely matches the new ticket and provide an set of solutions ranked by the closeness.</a:t>
+            </a:r>
+          </a:p>
+          <a:p>
+            <a:r>
+              <a:rPr lang="en-US" dirty="0">
+                <a:solidFill>
+                  <a:schemeClr val="bg1"/>
+                </a:solidFill>
+              </a:rPr>
+              <a:t>For non matching IT ticket, ticket is assigned to L1 agent and upon resolution , the entity and intent is added to our list and the question and the answer is saved for future reference.</a:t>
+            </a:r>
+          </a:p>
+          <a:p>
+            <a:r>
+              <a:rPr lang="en-US" dirty="0">
+                <a:solidFill>
+                  <a:schemeClr val="bg1"/>
+                </a:solidFill>
+              </a:rPr>
+              <a:t>Model is re trained to learn and multiclass tag the new question and old question with the new set of entities and intents.</a:t>
+            </a:r>
+          </a:p>
+          <a:p>
+            <a:r>
+              <a:rPr lang="en-US" dirty="0">
+                <a:solidFill>
+                  <a:schemeClr val="bg1"/>
+                </a:solidFill>
+              </a:rPr>
+              <a:t>Among the recommended solutions , the system tracks the best answer which the user is selecting and rejecting and appropriately rewards the solutions and after reasonable period of time, the system does Upper Confidence Bound based reinforcement learning to score the solutions belonging to each entity so that next time when a ticket appears belonging to that entity, the highest scored solutions is placed on top. </a:t>
             </a:r>
           </a:p>
           <a:p>
@@ -18932,7 +21119,7 @@
 </p:sld>
 </file>
 
-<file path=ppt/slides/slide8.xml><?xml version="1.0" encoding="utf-8"?>
+<file path=ppt/slides/slide9.xml><?xml version="1.0" encoding="utf-8"?>
 <p:sld xmlns:a="http://schemas.openxmlformats.org/drawingml/2006/main" xmlns:r="http://schemas.openxmlformats.org/officeDocument/2006/relationships" xmlns:p="http://schemas.openxmlformats.org/presentationml/2006/main">
   <p:cSld>
     <p:spTree>
@@ -19157,7 +21344,7 @@
         <p:spPr>
           <a:xfrm>
             <a:off x="800100" y="2082960"/>
-            <a:ext cx="8699500" cy="3539430"/>
+            <a:ext cx="8699500" cy="3754874"/>
           </a:xfrm>
           <a:prstGeom prst="rect">
             <a:avLst/>
@@ -19170,14 +21357,13 @@
           </a:bodyPr>
           <a:lstStyle/>
           <a:p>
-            <a:pPr algn="ctr"/>
             <a:r>
               <a:rPr lang="en-US" dirty="0">
                 <a:solidFill>
                   <a:schemeClr val="bg1"/>
                 </a:solidFill>
               </a:rPr>
-              <a:t>Add Text here</a:t>
+              <a:t>Based on the training and re training on the FAQ document and the sample input sheet.</a:t>
             </a:r>
           </a:p>
           <a:p>
@@ -19186,6 +21372,16 @@
                 <a:schemeClr val="bg1"/>
               </a:solidFill>
             </a:endParaRPr>
+          </a:p>
+          <a:p>
+            <a:r>
+              <a:rPr lang="en-US" dirty="0">
+                <a:solidFill>
+                  <a:schemeClr val="bg1"/>
+                </a:solidFill>
+              </a:rPr>
+              <a:t>8 out of the 9 questions are working with single training.</a:t>
+            </a:r>
           </a:p>
           <a:p>
             <a:endParaRPr lang="en-US" dirty="0">
@@ -19294,547 +21490,6 @@
         <p14:creationId xmlns:p14="http://schemas.microsoft.com/office/powerpoint/2010/main" val="84533534"/>
       </p:ext>
     </p:extLst>
-  </p:cSld>
-  <p:clrMapOvr>
-    <a:masterClrMapping/>
-  </p:clrMapOvr>
-</p:sld>
-</file>
-
-<file path=ppt/slides/slide9.xml><?xml version="1.0" encoding="utf-8"?>
-<p:sld xmlns:a="http://schemas.openxmlformats.org/drawingml/2006/main" xmlns:r="http://schemas.openxmlformats.org/officeDocument/2006/relationships" xmlns:p="http://schemas.openxmlformats.org/presentationml/2006/main">
-  <p:cSld>
-    <p:spTree>
-      <p:nvGrpSpPr>
-        <p:cNvPr id="1" name="Shape 150"/>
-        <p:cNvGrpSpPr/>
-        <p:nvPr/>
-      </p:nvGrpSpPr>
-      <p:grpSpPr>
-        <a:xfrm>
-          <a:off x="0" y="0"/>
-          <a:ext cx="0" cy="0"/>
-          <a:chOff x="0" y="0"/>
-          <a:chExt cx="0" cy="0"/>
-        </a:xfrm>
-      </p:grpSpPr>
-      <p:sp>
-        <p:nvSpPr>
-          <p:cNvPr id="151" name="Shape 151"/>
-          <p:cNvSpPr/>
-          <p:nvPr/>
-        </p:nvSpPr>
-        <p:spPr>
-          <a:xfrm>
-            <a:off x="503640" y="789480"/>
-            <a:ext cx="9138240" cy="4962600"/>
-          </a:xfrm>
-          <a:prstGeom prst="rect">
-            <a:avLst/>
-          </a:prstGeom>
-          <a:solidFill>
-            <a:srgbClr val="2F0E3C"/>
-          </a:solidFill>
-          <a:ln>
-            <a:noFill/>
-          </a:ln>
-        </p:spPr>
-        <p:txBody>
-          <a:bodyPr spcFirstLastPara="1" wrap="square" lIns="90000" tIns="45000" rIns="90000" bIns="45000" anchor="t" anchorCtr="0">
-            <a:noAutofit/>
-          </a:bodyPr>
-          <a:lstStyle/>
-          <a:p>
-            <a:pPr marL="0" marR="0" lvl="0" indent="0" algn="l" rtl="0">
-              <a:lnSpc>
-                <a:spcPct val="100000"/>
-              </a:lnSpc>
-              <a:spcBef>
-                <a:spcPts val="0"/>
-              </a:spcBef>
-              <a:spcAft>
-                <a:spcPts val="0"/>
-              </a:spcAft>
-              <a:buNone/>
-            </a:pPr>
-            <a:endParaRPr sz="1800" b="0" i="0" u="none" strike="noStrike" cap="none">
-              <a:solidFill>
-                <a:srgbClr val="000000"/>
-              </a:solidFill>
-              <a:latin typeface="Arial"/>
-              <a:ea typeface="Arial"/>
-              <a:cs typeface="Arial"/>
-              <a:sym typeface="Arial"/>
-            </a:endParaRPr>
-          </a:p>
-          <a:p>
-            <a:pPr marL="0" marR="0" lvl="0" indent="0" algn="l" rtl="0">
-              <a:lnSpc>
-                <a:spcPct val="100000"/>
-              </a:lnSpc>
-              <a:spcBef>
-                <a:spcPts val="0"/>
-              </a:spcBef>
-              <a:spcAft>
-                <a:spcPts val="0"/>
-              </a:spcAft>
-              <a:buNone/>
-            </a:pPr>
-            <a:endParaRPr sz="1800" b="0" i="0" u="none" strike="noStrike" cap="none">
-              <a:solidFill>
-                <a:srgbClr val="000000"/>
-              </a:solidFill>
-              <a:latin typeface="Arial"/>
-              <a:ea typeface="Arial"/>
-              <a:cs typeface="Arial"/>
-              <a:sym typeface="Arial"/>
-            </a:endParaRPr>
-          </a:p>
-          <a:p>
-            <a:pPr marL="0" marR="0" lvl="0" indent="0" algn="l" rtl="0">
-              <a:lnSpc>
-                <a:spcPct val="100000"/>
-              </a:lnSpc>
-              <a:spcBef>
-                <a:spcPts val="0"/>
-              </a:spcBef>
-              <a:spcAft>
-                <a:spcPts val="0"/>
-              </a:spcAft>
-              <a:buNone/>
-            </a:pPr>
-            <a:endParaRPr sz="1800" b="0" i="0" u="none" strike="noStrike" cap="none">
-              <a:solidFill>
-                <a:srgbClr val="000000"/>
-              </a:solidFill>
-              <a:latin typeface="Arial"/>
-              <a:ea typeface="Arial"/>
-              <a:cs typeface="Arial"/>
-              <a:sym typeface="Arial"/>
-            </a:endParaRPr>
-          </a:p>
-          <a:p>
-            <a:pPr marL="0" marR="0" lvl="0" indent="0" algn="l" rtl="0">
-              <a:lnSpc>
-                <a:spcPct val="100000"/>
-              </a:lnSpc>
-              <a:spcBef>
-                <a:spcPts val="0"/>
-              </a:spcBef>
-              <a:spcAft>
-                <a:spcPts val="0"/>
-              </a:spcAft>
-              <a:buNone/>
-            </a:pPr>
-            <a:endParaRPr sz="1800" b="0" i="0" u="none" strike="noStrike" cap="none">
-              <a:solidFill>
-                <a:srgbClr val="000000"/>
-              </a:solidFill>
-              <a:latin typeface="Arial"/>
-              <a:ea typeface="Arial"/>
-              <a:cs typeface="Arial"/>
-              <a:sym typeface="Arial"/>
-            </a:endParaRPr>
-          </a:p>
-          <a:p>
-            <a:pPr marL="0" marR="0" lvl="0" indent="0" algn="l" rtl="0">
-              <a:lnSpc>
-                <a:spcPct val="100000"/>
-              </a:lnSpc>
-              <a:spcBef>
-                <a:spcPts val="0"/>
-              </a:spcBef>
-              <a:spcAft>
-                <a:spcPts val="0"/>
-              </a:spcAft>
-              <a:buNone/>
-            </a:pPr>
-            <a:r>
-              <a:rPr lang="en-IN" sz="1800" b="0" i="0" u="none" strike="noStrike" cap="none">
-                <a:solidFill>
-                  <a:srgbClr val="FFFFFF"/>
-                </a:solidFill>
-                <a:latin typeface="Arial"/>
-                <a:ea typeface="Arial"/>
-                <a:cs typeface="Arial"/>
-                <a:sym typeface="Arial"/>
-              </a:rPr>
-              <a:t> </a:t>
-            </a:r>
-            <a:endParaRPr sz="1800" b="0" i="0" u="none" strike="noStrike" cap="none">
-              <a:solidFill>
-                <a:srgbClr val="000000"/>
-              </a:solidFill>
-              <a:latin typeface="Arial"/>
-              <a:ea typeface="Arial"/>
-              <a:cs typeface="Arial"/>
-              <a:sym typeface="Arial"/>
-            </a:endParaRPr>
-          </a:p>
-          <a:p>
-            <a:pPr marL="0" marR="0" lvl="0" indent="0" algn="l" rtl="0">
-              <a:lnSpc>
-                <a:spcPct val="100000"/>
-              </a:lnSpc>
-              <a:spcBef>
-                <a:spcPts val="0"/>
-              </a:spcBef>
-              <a:spcAft>
-                <a:spcPts val="0"/>
-              </a:spcAft>
-              <a:buNone/>
-            </a:pPr>
-            <a:endParaRPr sz="1800" b="0" i="0" u="none" strike="noStrike" cap="none">
-              <a:solidFill>
-                <a:srgbClr val="000000"/>
-              </a:solidFill>
-              <a:latin typeface="Arial"/>
-              <a:ea typeface="Arial"/>
-              <a:cs typeface="Arial"/>
-              <a:sym typeface="Arial"/>
-            </a:endParaRPr>
-          </a:p>
-          <a:p>
-            <a:pPr marL="0" marR="0" lvl="0" indent="0" algn="l" rtl="0">
-              <a:lnSpc>
-                <a:spcPct val="100000"/>
-              </a:lnSpc>
-              <a:spcBef>
-                <a:spcPts val="0"/>
-              </a:spcBef>
-              <a:spcAft>
-                <a:spcPts val="0"/>
-              </a:spcAft>
-              <a:buNone/>
-            </a:pPr>
-            <a:endParaRPr sz="1800" b="0" i="0" u="none" strike="noStrike" cap="none">
-              <a:solidFill>
-                <a:srgbClr val="000000"/>
-              </a:solidFill>
-              <a:latin typeface="Arial"/>
-              <a:ea typeface="Arial"/>
-              <a:cs typeface="Arial"/>
-              <a:sym typeface="Arial"/>
-            </a:endParaRPr>
-          </a:p>
-        </p:txBody>
-      </p:sp>
-      <p:sp>
-        <p:nvSpPr>
-          <p:cNvPr id="152" name="Shape 152"/>
-          <p:cNvSpPr/>
-          <p:nvPr/>
-        </p:nvSpPr>
-        <p:spPr>
-          <a:xfrm>
-            <a:off x="647640" y="1086120"/>
-            <a:ext cx="8566920" cy="1136380"/>
-          </a:xfrm>
-          <a:prstGeom prst="rect">
-            <a:avLst/>
-          </a:prstGeom>
-          <a:noFill/>
-          <a:ln>
-            <a:noFill/>
-          </a:ln>
-        </p:spPr>
-        <p:txBody>
-          <a:bodyPr spcFirstLastPara="1" wrap="square" lIns="90000" tIns="45000" rIns="90000" bIns="45000" anchor="t" anchorCtr="0">
-            <a:noAutofit/>
-          </a:bodyPr>
-          <a:lstStyle/>
-          <a:p>
-            <a:pPr marL="0" marR="0" lvl="0" indent="0" algn="l" rtl="0">
-              <a:lnSpc>
-                <a:spcPct val="100000"/>
-              </a:lnSpc>
-              <a:spcBef>
-                <a:spcPts val="0"/>
-              </a:spcBef>
-              <a:spcAft>
-                <a:spcPts val="0"/>
-              </a:spcAft>
-              <a:buNone/>
-            </a:pPr>
-            <a:r>
-              <a:rPr lang="en-IN" sz="3600" b="1" i="0" u="none" strike="noStrike" cap="none" dirty="0">
-                <a:solidFill>
-                  <a:srgbClr val="FFFFFF"/>
-                </a:solidFill>
-                <a:latin typeface="Arial"/>
-                <a:ea typeface="Arial"/>
-                <a:cs typeface="Arial"/>
-                <a:sym typeface="Arial"/>
-              </a:rPr>
-              <a:t>Prototype Demo</a:t>
-            </a:r>
-          </a:p>
-          <a:p>
-            <a:r>
-              <a:rPr lang="en-IN" dirty="0">
-                <a:solidFill>
-                  <a:srgbClr val="FFFFFF"/>
-                </a:solidFill>
-              </a:rPr>
-              <a:t>Add a video link of the workable solution. Please cover as many output scenario’s as you can show from the output excel provided. (Mandatory)</a:t>
-            </a:r>
-            <a:endParaRPr lang="en-IN" dirty="0"/>
-          </a:p>
-          <a:p>
-            <a:pPr marL="0" marR="0" lvl="0" indent="0" algn="l" rtl="0">
-              <a:lnSpc>
-                <a:spcPct val="100000"/>
-              </a:lnSpc>
-              <a:spcBef>
-                <a:spcPts val="0"/>
-              </a:spcBef>
-              <a:spcAft>
-                <a:spcPts val="0"/>
-              </a:spcAft>
-              <a:buNone/>
-            </a:pPr>
-            <a:endParaRPr sz="1800" b="0" i="0" u="none" strike="noStrike" cap="none" dirty="0">
-              <a:solidFill>
-                <a:srgbClr val="000000"/>
-              </a:solidFill>
-              <a:latin typeface="Arial"/>
-              <a:ea typeface="Arial"/>
-              <a:cs typeface="Arial"/>
-              <a:sym typeface="Arial"/>
-            </a:endParaRPr>
-          </a:p>
-          <a:p>
-            <a:pPr marL="0" marR="0" lvl="0" indent="0" algn="l" rtl="0">
-              <a:lnSpc>
-                <a:spcPct val="100000"/>
-              </a:lnSpc>
-              <a:spcBef>
-                <a:spcPts val="0"/>
-              </a:spcBef>
-              <a:spcAft>
-                <a:spcPts val="0"/>
-              </a:spcAft>
-              <a:buNone/>
-            </a:pPr>
-            <a:endParaRPr sz="1800" b="0" i="0" u="none" strike="noStrike" cap="none" dirty="0">
-              <a:solidFill>
-                <a:srgbClr val="000000"/>
-              </a:solidFill>
-              <a:latin typeface="Arial"/>
-              <a:ea typeface="Arial"/>
-              <a:cs typeface="Arial"/>
-              <a:sym typeface="Arial"/>
-            </a:endParaRPr>
-          </a:p>
-          <a:p>
-            <a:pPr marL="0" marR="0" lvl="0" indent="0" algn="ctr" rtl="0">
-              <a:lnSpc>
-                <a:spcPct val="42000"/>
-              </a:lnSpc>
-              <a:spcBef>
-                <a:spcPts val="0"/>
-              </a:spcBef>
-              <a:spcAft>
-                <a:spcPts val="0"/>
-              </a:spcAft>
-              <a:buNone/>
-            </a:pPr>
-            <a:endParaRPr sz="1800" b="0" i="0" u="none" strike="noStrike" cap="none" dirty="0">
-              <a:solidFill>
-                <a:srgbClr val="000000"/>
-              </a:solidFill>
-              <a:latin typeface="Arial"/>
-              <a:ea typeface="Arial"/>
-              <a:cs typeface="Arial"/>
-              <a:sym typeface="Arial"/>
-            </a:endParaRPr>
-          </a:p>
-          <a:p>
-            <a:pPr marL="0" marR="0" lvl="0" indent="0" algn="ctr" rtl="0">
-              <a:lnSpc>
-                <a:spcPct val="54000"/>
-              </a:lnSpc>
-              <a:spcBef>
-                <a:spcPts val="0"/>
-              </a:spcBef>
-              <a:spcAft>
-                <a:spcPts val="0"/>
-              </a:spcAft>
-              <a:buNone/>
-            </a:pPr>
-            <a:endParaRPr sz="1800" b="0" i="0" u="none" strike="noStrike" cap="none" dirty="0">
-              <a:solidFill>
-                <a:srgbClr val="000000"/>
-              </a:solidFill>
-              <a:latin typeface="Arial"/>
-              <a:ea typeface="Arial"/>
-              <a:cs typeface="Arial"/>
-              <a:sym typeface="Arial"/>
-            </a:endParaRPr>
-          </a:p>
-        </p:txBody>
-      </p:sp>
-      <p:pic>
-        <p:nvPicPr>
-          <p:cNvPr id="153" name="Shape 153"/>
-          <p:cNvPicPr preferRelativeResize="0"/>
-          <p:nvPr/>
-        </p:nvPicPr>
-        <p:blipFill rotWithShape="1">
-          <a:blip r:embed="rId3">
-            <a:alphaModFix/>
-          </a:blip>
-          <a:srcRect/>
-          <a:stretch/>
-        </p:blipFill>
-        <p:spPr>
-          <a:xfrm>
-            <a:off x="3888000" y="6782400"/>
-            <a:ext cx="2013480" cy="487080"/>
-          </a:xfrm>
-          <a:prstGeom prst="rect">
-            <a:avLst/>
-          </a:prstGeom>
-          <a:noFill/>
-          <a:ln>
-            <a:noFill/>
-          </a:ln>
-        </p:spPr>
-      </p:pic>
-      <p:sp>
-        <p:nvSpPr>
-          <p:cNvPr id="5" name="TextBox 4"/>
-          <p:cNvSpPr txBox="1"/>
-          <p:nvPr/>
-        </p:nvSpPr>
-        <p:spPr>
-          <a:xfrm>
-            <a:off x="723010" y="2318886"/>
-            <a:ext cx="8699500" cy="3323987"/>
-          </a:xfrm>
-          <a:prstGeom prst="rect">
-            <a:avLst/>
-          </a:prstGeom>
-          <a:noFill/>
-        </p:spPr>
-        <p:txBody>
-          <a:bodyPr wrap="square" rtlCol="0">
-            <a:spAutoFit/>
-          </a:bodyPr>
-          <a:lstStyle/>
-          <a:p>
-            <a:pPr algn="ctr"/>
-            <a:r>
-              <a:rPr lang="en-US" dirty="0">
-                <a:solidFill>
-                  <a:schemeClr val="bg1"/>
-                </a:solidFill>
-              </a:rPr>
-              <a:t>Add Text here</a:t>
-            </a:r>
-          </a:p>
-          <a:p>
-            <a:endParaRPr lang="en-US" dirty="0">
-              <a:solidFill>
-                <a:schemeClr val="bg1"/>
-              </a:solidFill>
-            </a:endParaRPr>
-          </a:p>
-          <a:p>
-            <a:endParaRPr lang="en-US" dirty="0">
-              <a:solidFill>
-                <a:schemeClr val="bg1"/>
-              </a:solidFill>
-            </a:endParaRPr>
-          </a:p>
-          <a:p>
-            <a:endParaRPr lang="en-US" dirty="0">
-              <a:solidFill>
-                <a:schemeClr val="bg1"/>
-              </a:solidFill>
-            </a:endParaRPr>
-          </a:p>
-          <a:p>
-            <a:endParaRPr lang="en-US" dirty="0">
-              <a:solidFill>
-                <a:schemeClr val="bg1"/>
-              </a:solidFill>
-            </a:endParaRPr>
-          </a:p>
-          <a:p>
-            <a:endParaRPr lang="en-US" dirty="0">
-              <a:solidFill>
-                <a:schemeClr val="bg1"/>
-              </a:solidFill>
-            </a:endParaRPr>
-          </a:p>
-          <a:p>
-            <a:endParaRPr lang="en-US" dirty="0">
-              <a:solidFill>
-                <a:schemeClr val="bg1"/>
-              </a:solidFill>
-            </a:endParaRPr>
-          </a:p>
-          <a:p>
-            <a:endParaRPr lang="en-US" dirty="0">
-              <a:solidFill>
-                <a:schemeClr val="bg1"/>
-              </a:solidFill>
-            </a:endParaRPr>
-          </a:p>
-          <a:p>
-            <a:endParaRPr lang="en-US" dirty="0">
-              <a:solidFill>
-                <a:schemeClr val="bg1"/>
-              </a:solidFill>
-            </a:endParaRPr>
-          </a:p>
-          <a:p>
-            <a:endParaRPr lang="en-US" dirty="0">
-              <a:solidFill>
-                <a:schemeClr val="bg1"/>
-              </a:solidFill>
-            </a:endParaRPr>
-          </a:p>
-          <a:p>
-            <a:endParaRPr lang="en-US" dirty="0">
-              <a:solidFill>
-                <a:schemeClr val="bg1"/>
-              </a:solidFill>
-            </a:endParaRPr>
-          </a:p>
-          <a:p>
-            <a:endParaRPr lang="en-US" dirty="0">
-              <a:solidFill>
-                <a:schemeClr val="bg1"/>
-              </a:solidFill>
-            </a:endParaRPr>
-          </a:p>
-          <a:p>
-            <a:endParaRPr lang="en-US" dirty="0">
-              <a:solidFill>
-                <a:schemeClr val="bg1"/>
-              </a:solidFill>
-            </a:endParaRPr>
-          </a:p>
-          <a:p>
-            <a:endParaRPr lang="en-US" dirty="0">
-              <a:solidFill>
-                <a:schemeClr val="bg1"/>
-              </a:solidFill>
-            </a:endParaRPr>
-          </a:p>
-          <a:p>
-            <a:pPr algn="ctr"/>
-            <a:endParaRPr lang="en-US" dirty="0">
-              <a:solidFill>
-                <a:schemeClr val="bg1"/>
-              </a:solidFill>
-            </a:endParaRPr>
-          </a:p>
-        </p:txBody>
-      </p:sp>
-    </p:spTree>
   </p:cSld>
   <p:clrMapOvr>
     <a:masterClrMapping/>

</xml_diff>

<commit_message>
Final changes with integrated app
</commit_message>
<xml_diff>
--- a/SolutionPresentation.pptx
+++ b/SolutionPresentation.pptx
@@ -14819,7 +14819,7 @@
               </a:spcAft>
               <a:buNone/>
             </a:pPr>
-            <a:endParaRPr sz="1800" b="0" i="0" u="none" strike="noStrike" cap="none">
+            <a:endParaRPr sz="1800" b="0" i="0" u="none" strike="noStrike" cap="none" dirty="0">
               <a:solidFill>
                 <a:srgbClr val="000000"/>
               </a:solidFill>
@@ -14842,7 +14842,7 @@
               </a:spcAft>
               <a:buNone/>
             </a:pPr>
-            <a:endParaRPr sz="1800" b="0" i="0" u="none" strike="noStrike" cap="none">
+            <a:endParaRPr sz="1800" b="0" i="0" u="none" strike="noStrike" cap="none" dirty="0">
               <a:solidFill>
                 <a:srgbClr val="000000"/>
               </a:solidFill>
@@ -14865,7 +14865,7 @@
               </a:spcAft>
               <a:buNone/>
             </a:pPr>
-            <a:endParaRPr sz="1800" b="0" i="0" u="none" strike="noStrike" cap="none">
+            <a:endParaRPr sz="1800" b="0" i="0" u="none" strike="noStrike" cap="none" dirty="0">
               <a:solidFill>
                 <a:srgbClr val="000000"/>
               </a:solidFill>
@@ -14888,7 +14888,7 @@
               </a:spcAft>
               <a:buNone/>
             </a:pPr>
-            <a:endParaRPr sz="1800" b="0" i="0" u="none" strike="noStrike" cap="none">
+            <a:endParaRPr sz="1800" b="0" i="0" u="none" strike="noStrike" cap="none" dirty="0">
               <a:solidFill>
                 <a:srgbClr val="000000"/>
               </a:solidFill>
@@ -14912,7 +14912,7 @@
               <a:buNone/>
             </a:pPr>
             <a:r>
-              <a:rPr lang="en-IN" sz="1800" b="0" i="0" u="none" strike="noStrike" cap="none">
+              <a:rPr lang="en-IN" sz="1800" b="0" i="0" u="none" strike="noStrike" cap="none" dirty="0">
                 <a:solidFill>
                   <a:srgbClr val="FFFFFF"/>
                 </a:solidFill>
@@ -14923,7 +14923,7 @@
               </a:rPr>
               <a:t> </a:t>
             </a:r>
-            <a:endParaRPr sz="1800" b="0" i="0" u="none" strike="noStrike" cap="none">
+            <a:endParaRPr sz="1800" b="0" i="0" u="none" strike="noStrike" cap="none" dirty="0">
               <a:solidFill>
                 <a:srgbClr val="000000"/>
               </a:solidFill>
@@ -14946,7 +14946,7 @@
               </a:spcAft>
               <a:buNone/>
             </a:pPr>
-            <a:endParaRPr sz="1800" b="0" i="0" u="none" strike="noStrike" cap="none">
+            <a:endParaRPr sz="1800" b="0" i="0" u="none" strike="noStrike" cap="none" dirty="0">
               <a:solidFill>
                 <a:srgbClr val="000000"/>
               </a:solidFill>
@@ -14969,7 +14969,7 @@
               </a:spcAft>
               <a:buNone/>
             </a:pPr>
-            <a:endParaRPr sz="1800" b="0" i="0" u="none" strike="noStrike" cap="none">
+            <a:endParaRPr sz="1800" b="0" i="0" u="none" strike="noStrike" cap="none" dirty="0">
               <a:solidFill>
                 <a:srgbClr val="000000"/>
               </a:solidFill>
@@ -15184,7 +15184,7 @@
         <p:spPr>
           <a:xfrm>
             <a:off x="723010" y="2318886"/>
-            <a:ext cx="8699500" cy="307777"/>
+            <a:ext cx="8699500" cy="738664"/>
           </a:xfrm>
           <a:prstGeom prst="rect">
             <a:avLst/>
@@ -15203,8 +15203,68 @@
                 <a:solidFill>
                   <a:schemeClr val="bg1"/>
                 </a:solidFill>
+                <a:hlinkClick r:id="rId4"/>
               </a:rPr>
-              <a:t>Application is not hosted currently but it can be viewed in a browser using R studio software.</a:t>
+              <a:t>https://snehashish30.shinyapps.io/NLP_chatbot_app/</a:t>
+            </a:r>
+            <a:endParaRPr lang="en-US" dirty="0">
+              <a:solidFill>
+                <a:schemeClr val="bg1"/>
+              </a:solidFill>
+            </a:endParaRPr>
+          </a:p>
+          <a:p>
+            <a:pPr algn="ctr"/>
+            <a:endParaRPr lang="en-US" dirty="0">
+              <a:solidFill>
+                <a:schemeClr val="bg1"/>
+              </a:solidFill>
+            </a:endParaRPr>
+          </a:p>
+          <a:p>
+            <a:pPr algn="ctr"/>
+            <a:r>
+              <a:rPr lang="en-US" dirty="0">
+                <a:solidFill>
+                  <a:schemeClr val="bg1"/>
+                </a:solidFill>
+              </a:rPr>
+              <a:t>NOTE: Please read the document: </a:t>
+            </a:r>
+            <a:r>
+              <a:rPr lang="en-US" dirty="0">
+                <a:solidFill>
+                  <a:schemeClr val="bg1"/>
+                </a:solidFill>
+                <a:hlinkClick r:id="rId5" action="ppaction://hlinkfile"/>
+              </a:rPr>
+              <a:t>How to use the </a:t>
+            </a:r>
+            <a:r>
+              <a:rPr lang="en-US" dirty="0" err="1">
+                <a:solidFill>
+                  <a:schemeClr val="bg1"/>
+                </a:solidFill>
+                <a:hlinkClick r:id="rId5" action="ppaction://hlinkfile"/>
+              </a:rPr>
+              <a:t>webapp</a:t>
+            </a:r>
+            <a:r>
+              <a:rPr lang="en-US" dirty="0">
+                <a:solidFill>
+                  <a:schemeClr val="bg1"/>
+                </a:solidFill>
+                <a:hlinkClick r:id="rId5" action="ppaction://hlinkfile"/>
+              </a:rPr>
+              <a:t> </a:t>
+            </a:r>
+            <a:r>
+              <a:rPr lang="en-US" dirty="0">
+                <a:solidFill>
+                  <a:schemeClr val="bg1"/>
+                </a:solidFill>
+              </a:rPr>
+              <a:t>for instructions</a:t>
             </a:r>
           </a:p>
         </p:txBody>
@@ -15833,14 +15893,14 @@
           <p:nvPr>
             <p:extLst>
               <p:ext uri="{D42A27DB-BD31-4B8C-83A1-F6EECF244321}">
-                <p14:modId xmlns:p14="http://schemas.microsoft.com/office/powerpoint/2010/main" val="3625520486"/>
+                <p14:modId xmlns:p14="http://schemas.microsoft.com/office/powerpoint/2010/main" val="2531687536"/>
               </p:ext>
             </p:extLst>
           </p:nvPr>
         </p:nvGraphicFramePr>
         <p:xfrm>
           <a:off x="956204" y="2435240"/>
-          <a:ext cx="8365596" cy="2362200"/>
+          <a:ext cx="8365596" cy="2936240"/>
         </p:xfrm>
         <a:graphic>
           <a:graphicData uri="http://schemas.openxmlformats.org/drawingml/2006/table">
@@ -16018,6 +16078,25 @@
                         <a:t>All the requested requirements</a:t>
                       </a:r>
                     </a:p>
+                    <a:p>
+                      <a:r>
+                        <a:rPr lang="en-US" dirty="0"/>
+                        <a:t>NLP based query resolution </a:t>
+                      </a:r>
+                    </a:p>
+                    <a:p>
+                      <a:r>
+                        <a:rPr lang="en-US" dirty="0"/>
+                        <a:t>UI</a:t>
+                      </a:r>
+                    </a:p>
+                    <a:p>
+                      <a:r>
+                        <a:rPr lang="en-US" dirty="0" err="1"/>
+                        <a:t>webapp</a:t>
+                      </a:r>
+                      <a:endParaRPr lang="en-US" dirty="0"/>
+                    </a:p>
                   </a:txBody>
                   <a:tcPr/>
                 </a:tc>
@@ -16329,21 +16408,8 @@
                   <a:schemeClr val="bg1"/>
                 </a:solidFill>
               </a:rPr>
-              <a:t>Sentiment Analysis can be done to improve the interactivity of the chatbot by learning on more of </a:t>
+              <a:t>Sentiment Analysis can be done to improve the interaction of the chatbot by learning on more of casual intents.</a:t>
             </a:r>
-            <a:r>
-              <a:rPr lang="en-US">
-                <a:solidFill>
-                  <a:schemeClr val="bg1"/>
-                </a:solidFill>
-              </a:rPr>
-              <a:t>casual intents.</a:t>
-            </a:r>
-            <a:endParaRPr lang="en-US" dirty="0">
-              <a:solidFill>
-                <a:schemeClr val="bg1"/>
-              </a:solidFill>
-            </a:endParaRPr>
           </a:p>
         </p:txBody>
       </p:sp>
@@ -18607,7 +18673,7 @@
         <p:spPr>
           <a:xfrm>
             <a:off x="800100" y="2082960"/>
-            <a:ext cx="8699500" cy="4832092"/>
+            <a:ext cx="8699500" cy="5078313"/>
           </a:xfrm>
           <a:prstGeom prst="rect">
             <a:avLst/>
@@ -18649,6 +18715,20 @@
                 </a:solidFill>
               </a:rPr>
               <a:t>The query is tagged with its parts of speech to retrieve the entity which is the noun and the intent which is the verb in the query statement.</a:t>
+            </a:r>
+          </a:p>
+          <a:p>
+            <a:pPr marL="285750" indent="-285750">
+              <a:buFont typeface="Arial" panose="020B0604020202020204" pitchFamily="34" charset="0"/>
+              <a:buChar char="•"/>
+            </a:pPr>
+            <a:r>
+              <a:rPr lang="en-US" dirty="0">
+                <a:solidFill>
+                  <a:schemeClr val="bg1"/>
+                </a:solidFill>
+              </a:rPr>
+              <a:t>Auto spelling correction is implemented to avoid typos and identify the close word. </a:t>
             </a:r>
           </a:p>
           <a:p>

</xml_diff>